<commit_message>
Sprawko do sprawdzenia jak ok to wrzucać to
</commit_message>
<xml_diff>
--- a/Lab9_zawieszenie/AP_L08_20190424_0800_G01.pptx
+++ b/Lab9_zawieszenie/AP_L08_20190424_0800_G01.pptx
@@ -146,7 +146,7 @@
   </p:defaultTextStyle>
   <p:extLst>
     <p:ext uri="{EFAFB233-063F-42B5-8137-9DF3F51BA10A}">
-      <p15:sldGuideLst xmlns:p15="http://schemas.microsoft.com/office/powerpoint/2012/main">
+      <p15:sldGuideLst xmlns="" xmlns:p15="http://schemas.microsoft.com/office/powerpoint/2012/main">
         <p15:guide id="1" orient="horz" pos="2160">
           <p15:clr>
             <a:srgbClr val="A4A3A4"/>
@@ -199,7 +199,7 @@
           <p:cNvPr id="2" name="Symbol zastępczy nagłówka 1">
             <a:extLst>
               <a:ext uri="{FF2B5EF4-FFF2-40B4-BE49-F238E27FC236}">
-                <a16:creationId xmlns:a16="http://schemas.microsoft.com/office/drawing/2014/main" id="{7C5BF4ED-BCB0-48A3-8924-309E33DEBB1F}"/>
+                <a16:creationId xmlns="" xmlns:a16="http://schemas.microsoft.com/office/drawing/2014/main" id="{7C5BF4ED-BCB0-48A3-8924-309E33DEBB1F}"/>
               </a:ext>
             </a:extLst>
           </p:cNvPr>
@@ -247,7 +247,7 @@
           <p:cNvPr id="3" name="Symbol zastępczy daty 2">
             <a:extLst>
               <a:ext uri="{FF2B5EF4-FFF2-40B4-BE49-F238E27FC236}">
-                <a16:creationId xmlns:a16="http://schemas.microsoft.com/office/drawing/2014/main" id="{BBC8DA4B-E5D3-46E4-B53C-1BD3D350B788}"/>
+                <a16:creationId xmlns="" xmlns:a16="http://schemas.microsoft.com/office/drawing/2014/main" id="{BBC8DA4B-E5D3-46E4-B53C-1BD3D350B788}"/>
               </a:ext>
             </a:extLst>
           </p:cNvPr>
@@ -291,7 +291,7 @@
               <a:pPr>
                 <a:defRPr/>
               </a:pPr>
-              <a:t>4/28/2019</a:t>
+              <a:t>5/4/2019</a:t>
             </a:fld>
             <a:endParaRPr lang="pl-PL"/>
           </a:p>
@@ -302,7 +302,7 @@
           <p:cNvPr id="4" name="Symbol zastępczy stopki 3">
             <a:extLst>
               <a:ext uri="{FF2B5EF4-FFF2-40B4-BE49-F238E27FC236}">
-                <a16:creationId xmlns:a16="http://schemas.microsoft.com/office/drawing/2014/main" id="{0CA902A4-96E3-4090-8871-57328D52566C}"/>
+                <a16:creationId xmlns="" xmlns:a16="http://schemas.microsoft.com/office/drawing/2014/main" id="{0CA902A4-96E3-4090-8871-57328D52566C}"/>
               </a:ext>
             </a:extLst>
           </p:cNvPr>
@@ -353,7 +353,7 @@
           <p:cNvPr id="5" name="Symbol zastępczy numeru slajdu 4">
             <a:extLst>
               <a:ext uri="{FF2B5EF4-FFF2-40B4-BE49-F238E27FC236}">
-                <a16:creationId xmlns:a16="http://schemas.microsoft.com/office/drawing/2014/main" id="{01330126-E675-4405-872A-422907E16422}"/>
+                <a16:creationId xmlns="" xmlns:a16="http://schemas.microsoft.com/office/drawing/2014/main" id="{01330126-E675-4405-872A-422907E16422}"/>
               </a:ext>
             </a:extLst>
           </p:cNvPr>
@@ -441,7 +441,7 @@
           <p:cNvPr id="2" name="Symbol zastępczy nagłówka 1">
             <a:extLst>
               <a:ext uri="{FF2B5EF4-FFF2-40B4-BE49-F238E27FC236}">
-                <a16:creationId xmlns:a16="http://schemas.microsoft.com/office/drawing/2014/main" id="{3588ECC7-7350-4D88-B588-EEF04071D45E}"/>
+                <a16:creationId xmlns="" xmlns:a16="http://schemas.microsoft.com/office/drawing/2014/main" id="{3588ECC7-7350-4D88-B588-EEF04071D45E}"/>
               </a:ext>
             </a:extLst>
           </p:cNvPr>
@@ -489,7 +489,7 @@
           <p:cNvPr id="3" name="Symbol zastępczy daty 2">
             <a:extLst>
               <a:ext uri="{FF2B5EF4-FFF2-40B4-BE49-F238E27FC236}">
-                <a16:creationId xmlns:a16="http://schemas.microsoft.com/office/drawing/2014/main" id="{B918CBFF-EAD8-404F-B02C-A7859DB92669}"/>
+                <a16:creationId xmlns="" xmlns:a16="http://schemas.microsoft.com/office/drawing/2014/main" id="{B918CBFF-EAD8-404F-B02C-A7859DB92669}"/>
               </a:ext>
             </a:extLst>
           </p:cNvPr>
@@ -533,7 +533,7 @@
               <a:pPr>
                 <a:defRPr/>
               </a:pPr>
-              <a:t>4/28/2019</a:t>
+              <a:t>5/4/2019</a:t>
             </a:fld>
             <a:endParaRPr lang="pl-PL"/>
           </a:p>
@@ -544,7 +544,7 @@
           <p:cNvPr id="4" name="Symbol zastępczy obrazu slajdu 3">
             <a:extLst>
               <a:ext uri="{FF2B5EF4-FFF2-40B4-BE49-F238E27FC236}">
-                <a16:creationId xmlns:a16="http://schemas.microsoft.com/office/drawing/2014/main" id="{A710DA0F-396F-4DE1-BC41-AE100DB86B35}"/>
+                <a16:creationId xmlns="" xmlns:a16="http://schemas.microsoft.com/office/drawing/2014/main" id="{A710DA0F-396F-4DE1-BC41-AE100DB86B35}"/>
               </a:ext>
             </a:extLst>
           </p:cNvPr>
@@ -584,7 +584,7 @@
           <p:cNvPr id="5" name="Symbol zastępczy notatek 4">
             <a:extLst>
               <a:ext uri="{FF2B5EF4-FFF2-40B4-BE49-F238E27FC236}">
-                <a16:creationId xmlns:a16="http://schemas.microsoft.com/office/drawing/2014/main" id="{8D25A859-3A66-4122-8507-D16A64A78B86}"/>
+                <a16:creationId xmlns="" xmlns:a16="http://schemas.microsoft.com/office/drawing/2014/main" id="{8D25A859-3A66-4122-8507-D16A64A78B86}"/>
               </a:ext>
             </a:extLst>
           </p:cNvPr>
@@ -649,7 +649,7 @@
           <p:cNvPr id="6" name="Symbol zastępczy stopki 5">
             <a:extLst>
               <a:ext uri="{FF2B5EF4-FFF2-40B4-BE49-F238E27FC236}">
-                <a16:creationId xmlns:a16="http://schemas.microsoft.com/office/drawing/2014/main" id="{870478CA-67FD-494A-985A-C7DCE106BD13}"/>
+                <a16:creationId xmlns="" xmlns:a16="http://schemas.microsoft.com/office/drawing/2014/main" id="{870478CA-67FD-494A-985A-C7DCE106BD13}"/>
               </a:ext>
             </a:extLst>
           </p:cNvPr>
@@ -700,7 +700,7 @@
           <p:cNvPr id="7" name="Symbol zastępczy numeru slajdu 6">
             <a:extLst>
               <a:ext uri="{FF2B5EF4-FFF2-40B4-BE49-F238E27FC236}">
-                <a16:creationId xmlns:a16="http://schemas.microsoft.com/office/drawing/2014/main" id="{DED305A8-5DE4-4236-8DF6-21B66550B569}"/>
+                <a16:creationId xmlns="" xmlns:a16="http://schemas.microsoft.com/office/drawing/2014/main" id="{DED305A8-5DE4-4236-8DF6-21B66550B569}"/>
               </a:ext>
             </a:extLst>
           </p:cNvPr>
@@ -902,7 +902,7 @@
           <p:cNvPr id="5122" name="Symbol zastępczy obrazu slajdu 1">
             <a:extLst>
               <a:ext uri="{FF2B5EF4-FFF2-40B4-BE49-F238E27FC236}">
-                <a16:creationId xmlns:a16="http://schemas.microsoft.com/office/drawing/2014/main" id="{FE0C0804-9EDC-4125-8681-AC6464DEDCF7}"/>
+                <a16:creationId xmlns="" xmlns:a16="http://schemas.microsoft.com/office/drawing/2014/main" id="{FE0C0804-9EDC-4125-8681-AC6464DEDCF7}"/>
               </a:ext>
             </a:extLst>
           </p:cNvPr>
@@ -939,7 +939,7 @@
           <p:cNvPr id="5123" name="Symbol zastępczy notatek 2">
             <a:extLst>
               <a:ext uri="{FF2B5EF4-FFF2-40B4-BE49-F238E27FC236}">
-                <a16:creationId xmlns:a16="http://schemas.microsoft.com/office/drawing/2014/main" id="{3F8CBB60-ABF2-4205-8999-B59E3FA3A85B}"/>
+                <a16:creationId xmlns="" xmlns:a16="http://schemas.microsoft.com/office/drawing/2014/main" id="{3F8CBB60-ABF2-4205-8999-B59E3FA3A85B}"/>
               </a:ext>
             </a:extLst>
           </p:cNvPr>
@@ -994,7 +994,7 @@
           <p:cNvPr id="5124" name="Footer Placeholder 3">
             <a:extLst>
               <a:ext uri="{FF2B5EF4-FFF2-40B4-BE49-F238E27FC236}">
-                <a16:creationId xmlns:a16="http://schemas.microsoft.com/office/drawing/2014/main" id="{D5EF9514-BB9C-401E-B0BB-5646A06FE333}"/>
+                <a16:creationId xmlns="" xmlns:a16="http://schemas.microsoft.com/office/drawing/2014/main" id="{D5EF9514-BB9C-401E-B0BB-5646A06FE333}"/>
               </a:ext>
             </a:extLst>
           </p:cNvPr>
@@ -1177,7 +1177,7 @@
           <p:cNvPr id="7170" name="Symbol zastępczy obrazu slajdu 1">
             <a:extLst>
               <a:ext uri="{FF2B5EF4-FFF2-40B4-BE49-F238E27FC236}">
-                <a16:creationId xmlns:a16="http://schemas.microsoft.com/office/drawing/2014/main" id="{44089F52-FCC3-4F92-8075-69E6A0B7A999}"/>
+                <a16:creationId xmlns="" xmlns:a16="http://schemas.microsoft.com/office/drawing/2014/main" id="{44089F52-FCC3-4F92-8075-69E6A0B7A999}"/>
               </a:ext>
             </a:extLst>
           </p:cNvPr>
@@ -1214,7 +1214,7 @@
           <p:cNvPr id="7171" name="Symbol zastępczy notatek 2">
             <a:extLst>
               <a:ext uri="{FF2B5EF4-FFF2-40B4-BE49-F238E27FC236}">
-                <a16:creationId xmlns:a16="http://schemas.microsoft.com/office/drawing/2014/main" id="{8D5F7E77-5CFF-4068-B149-CBDEE078C652}"/>
+                <a16:creationId xmlns="" xmlns:a16="http://schemas.microsoft.com/office/drawing/2014/main" id="{8D5F7E77-5CFF-4068-B149-CBDEE078C652}"/>
               </a:ext>
             </a:extLst>
           </p:cNvPr>
@@ -1269,7 +1269,7 @@
           <p:cNvPr id="7172" name="Footer Placeholder 3">
             <a:extLst>
               <a:ext uri="{FF2B5EF4-FFF2-40B4-BE49-F238E27FC236}">
-                <a16:creationId xmlns:a16="http://schemas.microsoft.com/office/drawing/2014/main" id="{AA8F79A3-A557-4B9C-A2E2-91B7684DAD2E}"/>
+                <a16:creationId xmlns="" xmlns:a16="http://schemas.microsoft.com/office/drawing/2014/main" id="{AA8F79A3-A557-4B9C-A2E2-91B7684DAD2E}"/>
               </a:ext>
             </a:extLst>
           </p:cNvPr>
@@ -1452,7 +1452,7 @@
           <p:cNvPr id="9218" name="Symbol zastępczy obrazu slajdu 1">
             <a:extLst>
               <a:ext uri="{FF2B5EF4-FFF2-40B4-BE49-F238E27FC236}">
-                <a16:creationId xmlns:a16="http://schemas.microsoft.com/office/drawing/2014/main" id="{2E763E06-6975-4291-9396-E007D348F002}"/>
+                <a16:creationId xmlns="" xmlns:a16="http://schemas.microsoft.com/office/drawing/2014/main" id="{2E763E06-6975-4291-9396-E007D348F002}"/>
               </a:ext>
             </a:extLst>
           </p:cNvPr>
@@ -1489,7 +1489,7 @@
           <p:cNvPr id="9219" name="Symbol zastępczy notatek 2">
             <a:extLst>
               <a:ext uri="{FF2B5EF4-FFF2-40B4-BE49-F238E27FC236}">
-                <a16:creationId xmlns:a16="http://schemas.microsoft.com/office/drawing/2014/main" id="{1667920A-8AFB-4861-A38A-D5894CB1BFB4}"/>
+                <a16:creationId xmlns="" xmlns:a16="http://schemas.microsoft.com/office/drawing/2014/main" id="{1667920A-8AFB-4861-A38A-D5894CB1BFB4}"/>
               </a:ext>
             </a:extLst>
           </p:cNvPr>
@@ -1544,7 +1544,7 @@
           <p:cNvPr id="9220" name="Footer Placeholder 3">
             <a:extLst>
               <a:ext uri="{FF2B5EF4-FFF2-40B4-BE49-F238E27FC236}">
-                <a16:creationId xmlns:a16="http://schemas.microsoft.com/office/drawing/2014/main" id="{7050523F-C371-45FF-81B6-37C32CA0BCF5}"/>
+                <a16:creationId xmlns="" xmlns:a16="http://schemas.microsoft.com/office/drawing/2014/main" id="{7050523F-C371-45FF-81B6-37C32CA0BCF5}"/>
               </a:ext>
             </a:extLst>
           </p:cNvPr>
@@ -1727,7 +1727,7 @@
           <p:cNvPr id="11266" name="Symbol zastępczy obrazu slajdu 1">
             <a:extLst>
               <a:ext uri="{FF2B5EF4-FFF2-40B4-BE49-F238E27FC236}">
-                <a16:creationId xmlns:a16="http://schemas.microsoft.com/office/drawing/2014/main" id="{1D685761-A83C-4245-8B93-3D0E78DDDF74}"/>
+                <a16:creationId xmlns="" xmlns:a16="http://schemas.microsoft.com/office/drawing/2014/main" id="{1D685761-A83C-4245-8B93-3D0E78DDDF74}"/>
               </a:ext>
             </a:extLst>
           </p:cNvPr>
@@ -1764,7 +1764,7 @@
           <p:cNvPr id="11267" name="Symbol zastępczy notatek 2">
             <a:extLst>
               <a:ext uri="{FF2B5EF4-FFF2-40B4-BE49-F238E27FC236}">
-                <a16:creationId xmlns:a16="http://schemas.microsoft.com/office/drawing/2014/main" id="{D4AFCA37-FEA7-48B1-BB75-40242D77E3B6}"/>
+                <a16:creationId xmlns="" xmlns:a16="http://schemas.microsoft.com/office/drawing/2014/main" id="{D4AFCA37-FEA7-48B1-BB75-40242D77E3B6}"/>
               </a:ext>
             </a:extLst>
           </p:cNvPr>
@@ -1819,7 +1819,7 @@
           <p:cNvPr id="11268" name="Footer Placeholder 3">
             <a:extLst>
               <a:ext uri="{FF2B5EF4-FFF2-40B4-BE49-F238E27FC236}">
-                <a16:creationId xmlns:a16="http://schemas.microsoft.com/office/drawing/2014/main" id="{2B29F252-6F80-4D0A-8993-6AC27CE13095}"/>
+                <a16:creationId xmlns="" xmlns:a16="http://schemas.microsoft.com/office/drawing/2014/main" id="{2B29F252-6F80-4D0A-8993-6AC27CE13095}"/>
               </a:ext>
             </a:extLst>
           </p:cNvPr>
@@ -2002,7 +2002,7 @@
           <p:cNvPr id="13314" name="Symbol zastępczy obrazu slajdu 1">
             <a:extLst>
               <a:ext uri="{FF2B5EF4-FFF2-40B4-BE49-F238E27FC236}">
-                <a16:creationId xmlns:a16="http://schemas.microsoft.com/office/drawing/2014/main" id="{BFFB5DEE-EB42-460D-A70D-597E5A9DEC8C}"/>
+                <a16:creationId xmlns="" xmlns:a16="http://schemas.microsoft.com/office/drawing/2014/main" id="{BFFB5DEE-EB42-460D-A70D-597E5A9DEC8C}"/>
               </a:ext>
             </a:extLst>
           </p:cNvPr>
@@ -2039,7 +2039,7 @@
           <p:cNvPr id="13315" name="Symbol zastępczy notatek 2">
             <a:extLst>
               <a:ext uri="{FF2B5EF4-FFF2-40B4-BE49-F238E27FC236}">
-                <a16:creationId xmlns:a16="http://schemas.microsoft.com/office/drawing/2014/main" id="{10FCBC51-98AA-470A-AD7E-65C00CA78A3A}"/>
+                <a16:creationId xmlns="" xmlns:a16="http://schemas.microsoft.com/office/drawing/2014/main" id="{10FCBC51-98AA-470A-AD7E-65C00CA78A3A}"/>
               </a:ext>
             </a:extLst>
           </p:cNvPr>
@@ -2094,7 +2094,7 @@
           <p:cNvPr id="13316" name="Footer Placeholder 3">
             <a:extLst>
               <a:ext uri="{FF2B5EF4-FFF2-40B4-BE49-F238E27FC236}">
-                <a16:creationId xmlns:a16="http://schemas.microsoft.com/office/drawing/2014/main" id="{85BD3775-6D7B-48E0-831E-C0859E49ACC4}"/>
+                <a16:creationId xmlns="" xmlns:a16="http://schemas.microsoft.com/office/drawing/2014/main" id="{85BD3775-6D7B-48E0-831E-C0859E49ACC4}"/>
               </a:ext>
             </a:extLst>
           </p:cNvPr>
@@ -2422,7 +2422,7 @@
           <p:cNvPr id="4" name="Symbol zastępczy daty 3">
             <a:extLst>
               <a:ext uri="{FF2B5EF4-FFF2-40B4-BE49-F238E27FC236}">
-                <a16:creationId xmlns:a16="http://schemas.microsoft.com/office/drawing/2014/main" id="{E0DC5341-7ED1-4138-AB98-A24E7CF204DC}"/>
+                <a16:creationId xmlns="" xmlns:a16="http://schemas.microsoft.com/office/drawing/2014/main" id="{E0DC5341-7ED1-4138-AB98-A24E7CF204DC}"/>
               </a:ext>
             </a:extLst>
           </p:cNvPr>
@@ -2458,7 +2458,7 @@
           <p:cNvPr id="5" name="Symbol zastępczy stopki 4">
             <a:extLst>
               <a:ext uri="{FF2B5EF4-FFF2-40B4-BE49-F238E27FC236}">
-                <a16:creationId xmlns:a16="http://schemas.microsoft.com/office/drawing/2014/main" id="{27744640-7C69-4322-BD8F-A67410DB9D7D}"/>
+                <a16:creationId xmlns="" xmlns:a16="http://schemas.microsoft.com/office/drawing/2014/main" id="{27744640-7C69-4322-BD8F-A67410DB9D7D}"/>
               </a:ext>
             </a:extLst>
           </p:cNvPr>
@@ -2494,7 +2494,7 @@
           <p:cNvPr id="6" name="Symbol zastępczy numeru slajdu 5">
             <a:extLst>
               <a:ext uri="{FF2B5EF4-FFF2-40B4-BE49-F238E27FC236}">
-                <a16:creationId xmlns:a16="http://schemas.microsoft.com/office/drawing/2014/main" id="{3AF78FD0-2C7D-4DCF-BB88-B13CE85F68C0}"/>
+                <a16:creationId xmlns="" xmlns:a16="http://schemas.microsoft.com/office/drawing/2014/main" id="{3AF78FD0-2C7D-4DCF-BB88-B13CE85F68C0}"/>
               </a:ext>
             </a:extLst>
           </p:cNvPr>
@@ -2636,7 +2636,7 @@
           <p:cNvPr id="4" name="Symbol zastępczy daty 3">
             <a:extLst>
               <a:ext uri="{FF2B5EF4-FFF2-40B4-BE49-F238E27FC236}">
-                <a16:creationId xmlns:a16="http://schemas.microsoft.com/office/drawing/2014/main" id="{30A96713-F7A5-417C-BBE3-F5A10A5E58D7}"/>
+                <a16:creationId xmlns="" xmlns:a16="http://schemas.microsoft.com/office/drawing/2014/main" id="{30A96713-F7A5-417C-BBE3-F5A10A5E58D7}"/>
               </a:ext>
             </a:extLst>
           </p:cNvPr>
@@ -2672,7 +2672,7 @@
           <p:cNvPr id="5" name="Symbol zastępczy stopki 4">
             <a:extLst>
               <a:ext uri="{FF2B5EF4-FFF2-40B4-BE49-F238E27FC236}">
-                <a16:creationId xmlns:a16="http://schemas.microsoft.com/office/drawing/2014/main" id="{8130E937-9D54-41C9-8B3D-5B75B35BB1F0}"/>
+                <a16:creationId xmlns="" xmlns:a16="http://schemas.microsoft.com/office/drawing/2014/main" id="{8130E937-9D54-41C9-8B3D-5B75B35BB1F0}"/>
               </a:ext>
             </a:extLst>
           </p:cNvPr>
@@ -2708,7 +2708,7 @@
           <p:cNvPr id="6" name="Symbol zastępczy numeru slajdu 5">
             <a:extLst>
               <a:ext uri="{FF2B5EF4-FFF2-40B4-BE49-F238E27FC236}">
-                <a16:creationId xmlns:a16="http://schemas.microsoft.com/office/drawing/2014/main" id="{13EF4D1C-8895-4730-B77D-895EDA4CEF26}"/>
+                <a16:creationId xmlns="" xmlns:a16="http://schemas.microsoft.com/office/drawing/2014/main" id="{13EF4D1C-8895-4730-B77D-895EDA4CEF26}"/>
               </a:ext>
             </a:extLst>
           </p:cNvPr>
@@ -2860,7 +2860,7 @@
           <p:cNvPr id="4" name="Symbol zastępczy daty 3">
             <a:extLst>
               <a:ext uri="{FF2B5EF4-FFF2-40B4-BE49-F238E27FC236}">
-                <a16:creationId xmlns:a16="http://schemas.microsoft.com/office/drawing/2014/main" id="{37E427B2-020A-4822-A2E2-AB761810EBDE}"/>
+                <a16:creationId xmlns="" xmlns:a16="http://schemas.microsoft.com/office/drawing/2014/main" id="{37E427B2-020A-4822-A2E2-AB761810EBDE}"/>
               </a:ext>
             </a:extLst>
           </p:cNvPr>
@@ -2896,7 +2896,7 @@
           <p:cNvPr id="5" name="Symbol zastępczy stopki 4">
             <a:extLst>
               <a:ext uri="{FF2B5EF4-FFF2-40B4-BE49-F238E27FC236}">
-                <a16:creationId xmlns:a16="http://schemas.microsoft.com/office/drawing/2014/main" id="{BB6B2E77-AC49-4E5E-9F3D-8B8B1E079E32}"/>
+                <a16:creationId xmlns="" xmlns:a16="http://schemas.microsoft.com/office/drawing/2014/main" id="{BB6B2E77-AC49-4E5E-9F3D-8B8B1E079E32}"/>
               </a:ext>
             </a:extLst>
           </p:cNvPr>
@@ -2932,7 +2932,7 @@
           <p:cNvPr id="6" name="Symbol zastępczy numeru slajdu 5">
             <a:extLst>
               <a:ext uri="{FF2B5EF4-FFF2-40B4-BE49-F238E27FC236}">
-                <a16:creationId xmlns:a16="http://schemas.microsoft.com/office/drawing/2014/main" id="{3CADA704-F91C-4EA6-A4C7-2A036940C071}"/>
+                <a16:creationId xmlns="" xmlns:a16="http://schemas.microsoft.com/office/drawing/2014/main" id="{3CADA704-F91C-4EA6-A4C7-2A036940C071}"/>
               </a:ext>
             </a:extLst>
           </p:cNvPr>
@@ -3074,7 +3074,7 @@
           <p:cNvPr id="4" name="Symbol zastępczy daty 3">
             <a:extLst>
               <a:ext uri="{FF2B5EF4-FFF2-40B4-BE49-F238E27FC236}">
-                <a16:creationId xmlns:a16="http://schemas.microsoft.com/office/drawing/2014/main" id="{EC0A8D81-67EE-4FD3-9A86-20CF06D137BD}"/>
+                <a16:creationId xmlns="" xmlns:a16="http://schemas.microsoft.com/office/drawing/2014/main" id="{EC0A8D81-67EE-4FD3-9A86-20CF06D137BD}"/>
               </a:ext>
             </a:extLst>
           </p:cNvPr>
@@ -3110,7 +3110,7 @@
           <p:cNvPr id="5" name="Symbol zastępczy stopki 4">
             <a:extLst>
               <a:ext uri="{FF2B5EF4-FFF2-40B4-BE49-F238E27FC236}">
-                <a16:creationId xmlns:a16="http://schemas.microsoft.com/office/drawing/2014/main" id="{28CC4DE4-CFD7-4057-88F5-222582512E78}"/>
+                <a16:creationId xmlns="" xmlns:a16="http://schemas.microsoft.com/office/drawing/2014/main" id="{28CC4DE4-CFD7-4057-88F5-222582512E78}"/>
               </a:ext>
             </a:extLst>
           </p:cNvPr>
@@ -3146,7 +3146,7 @@
           <p:cNvPr id="6" name="Symbol zastępczy numeru slajdu 5">
             <a:extLst>
               <a:ext uri="{FF2B5EF4-FFF2-40B4-BE49-F238E27FC236}">
-                <a16:creationId xmlns:a16="http://schemas.microsoft.com/office/drawing/2014/main" id="{EB3B4FDB-C5EC-4FC6-A684-3FDE2EA65648}"/>
+                <a16:creationId xmlns="" xmlns:a16="http://schemas.microsoft.com/office/drawing/2014/main" id="{EB3B4FDB-C5EC-4FC6-A684-3FDE2EA65648}"/>
               </a:ext>
             </a:extLst>
           </p:cNvPr>
@@ -3365,7 +3365,7 @@
           <p:cNvPr id="4" name="Symbol zastępczy daty 3">
             <a:extLst>
               <a:ext uri="{FF2B5EF4-FFF2-40B4-BE49-F238E27FC236}">
-                <a16:creationId xmlns:a16="http://schemas.microsoft.com/office/drawing/2014/main" id="{7F6FA52C-E9EF-4F15-A4B8-A14042629C74}"/>
+                <a16:creationId xmlns="" xmlns:a16="http://schemas.microsoft.com/office/drawing/2014/main" id="{7F6FA52C-E9EF-4F15-A4B8-A14042629C74}"/>
               </a:ext>
             </a:extLst>
           </p:cNvPr>
@@ -3401,7 +3401,7 @@
           <p:cNvPr id="5" name="Symbol zastępczy stopki 4">
             <a:extLst>
               <a:ext uri="{FF2B5EF4-FFF2-40B4-BE49-F238E27FC236}">
-                <a16:creationId xmlns:a16="http://schemas.microsoft.com/office/drawing/2014/main" id="{217D119C-15A9-473F-AA7E-4EDDC6D1CECB}"/>
+                <a16:creationId xmlns="" xmlns:a16="http://schemas.microsoft.com/office/drawing/2014/main" id="{217D119C-15A9-473F-AA7E-4EDDC6D1CECB}"/>
               </a:ext>
             </a:extLst>
           </p:cNvPr>
@@ -3437,7 +3437,7 @@
           <p:cNvPr id="6" name="Symbol zastępczy numeru slajdu 5">
             <a:extLst>
               <a:ext uri="{FF2B5EF4-FFF2-40B4-BE49-F238E27FC236}">
-                <a16:creationId xmlns:a16="http://schemas.microsoft.com/office/drawing/2014/main" id="{EE60E423-501B-4CBA-AD5B-A4128992E7B2}"/>
+                <a16:creationId xmlns="" xmlns:a16="http://schemas.microsoft.com/office/drawing/2014/main" id="{EE60E423-501B-4CBA-AD5B-A4128992E7B2}"/>
               </a:ext>
             </a:extLst>
           </p:cNvPr>
@@ -3696,7 +3696,7 @@
           <p:cNvPr id="5" name="Symbol zastępczy daty 3">
             <a:extLst>
               <a:ext uri="{FF2B5EF4-FFF2-40B4-BE49-F238E27FC236}">
-                <a16:creationId xmlns:a16="http://schemas.microsoft.com/office/drawing/2014/main" id="{267ED59B-53CC-4AA2-87E0-B0F82EEBD94F}"/>
+                <a16:creationId xmlns="" xmlns:a16="http://schemas.microsoft.com/office/drawing/2014/main" id="{267ED59B-53CC-4AA2-87E0-B0F82EEBD94F}"/>
               </a:ext>
             </a:extLst>
           </p:cNvPr>
@@ -3732,7 +3732,7 @@
           <p:cNvPr id="6" name="Symbol zastępczy stopki 4">
             <a:extLst>
               <a:ext uri="{FF2B5EF4-FFF2-40B4-BE49-F238E27FC236}">
-                <a16:creationId xmlns:a16="http://schemas.microsoft.com/office/drawing/2014/main" id="{6C5952BD-3A01-4966-99CF-CABCFA644007}"/>
+                <a16:creationId xmlns="" xmlns:a16="http://schemas.microsoft.com/office/drawing/2014/main" id="{6C5952BD-3A01-4966-99CF-CABCFA644007}"/>
               </a:ext>
             </a:extLst>
           </p:cNvPr>
@@ -3768,7 +3768,7 @@
           <p:cNvPr id="7" name="Symbol zastępczy numeru slajdu 5">
             <a:extLst>
               <a:ext uri="{FF2B5EF4-FFF2-40B4-BE49-F238E27FC236}">
-                <a16:creationId xmlns:a16="http://schemas.microsoft.com/office/drawing/2014/main" id="{59DCBAA7-D486-4E26-8F39-6B54F697AAEF}"/>
+                <a16:creationId xmlns="" xmlns:a16="http://schemas.microsoft.com/office/drawing/2014/main" id="{59DCBAA7-D486-4E26-8F39-6B54F697AAEF}"/>
               </a:ext>
             </a:extLst>
           </p:cNvPr>
@@ -4161,7 +4161,7 @@
           <p:cNvPr id="7" name="Symbol zastępczy daty 3">
             <a:extLst>
               <a:ext uri="{FF2B5EF4-FFF2-40B4-BE49-F238E27FC236}">
-                <a16:creationId xmlns:a16="http://schemas.microsoft.com/office/drawing/2014/main" id="{089B8381-8216-45CC-8D78-C70527B6107D}"/>
+                <a16:creationId xmlns="" xmlns:a16="http://schemas.microsoft.com/office/drawing/2014/main" id="{089B8381-8216-45CC-8D78-C70527B6107D}"/>
               </a:ext>
             </a:extLst>
           </p:cNvPr>
@@ -4197,7 +4197,7 @@
           <p:cNvPr id="8" name="Symbol zastępczy stopki 4">
             <a:extLst>
               <a:ext uri="{FF2B5EF4-FFF2-40B4-BE49-F238E27FC236}">
-                <a16:creationId xmlns:a16="http://schemas.microsoft.com/office/drawing/2014/main" id="{CF976F9B-BF58-48ED-BFC2-2C75AAFEE582}"/>
+                <a16:creationId xmlns="" xmlns:a16="http://schemas.microsoft.com/office/drawing/2014/main" id="{CF976F9B-BF58-48ED-BFC2-2C75AAFEE582}"/>
               </a:ext>
             </a:extLst>
           </p:cNvPr>
@@ -4233,7 +4233,7 @@
           <p:cNvPr id="9" name="Symbol zastępczy numeru slajdu 5">
             <a:extLst>
               <a:ext uri="{FF2B5EF4-FFF2-40B4-BE49-F238E27FC236}">
-                <a16:creationId xmlns:a16="http://schemas.microsoft.com/office/drawing/2014/main" id="{3C09754B-68D1-4D0F-A22E-9E75915110F9}"/>
+                <a16:creationId xmlns="" xmlns:a16="http://schemas.microsoft.com/office/drawing/2014/main" id="{3C09754B-68D1-4D0F-A22E-9E75915110F9}"/>
               </a:ext>
             </a:extLst>
           </p:cNvPr>
@@ -4324,7 +4324,7 @@
           <p:cNvPr id="3" name="Symbol zastępczy daty 3">
             <a:extLst>
               <a:ext uri="{FF2B5EF4-FFF2-40B4-BE49-F238E27FC236}">
-                <a16:creationId xmlns:a16="http://schemas.microsoft.com/office/drawing/2014/main" id="{E3B1253E-DC24-46D4-B0B1-DFCBC0B04E89}"/>
+                <a16:creationId xmlns="" xmlns:a16="http://schemas.microsoft.com/office/drawing/2014/main" id="{E3B1253E-DC24-46D4-B0B1-DFCBC0B04E89}"/>
               </a:ext>
             </a:extLst>
           </p:cNvPr>
@@ -4360,7 +4360,7 @@
           <p:cNvPr id="4" name="Symbol zastępczy stopki 4">
             <a:extLst>
               <a:ext uri="{FF2B5EF4-FFF2-40B4-BE49-F238E27FC236}">
-                <a16:creationId xmlns:a16="http://schemas.microsoft.com/office/drawing/2014/main" id="{6C69807C-25C7-4EC2-B77E-C51D17A9EF9B}"/>
+                <a16:creationId xmlns="" xmlns:a16="http://schemas.microsoft.com/office/drawing/2014/main" id="{6C69807C-25C7-4EC2-B77E-C51D17A9EF9B}"/>
               </a:ext>
             </a:extLst>
           </p:cNvPr>
@@ -4396,7 +4396,7 @@
           <p:cNvPr id="5" name="Symbol zastępczy numeru slajdu 5">
             <a:extLst>
               <a:ext uri="{FF2B5EF4-FFF2-40B4-BE49-F238E27FC236}">
-                <a16:creationId xmlns:a16="http://schemas.microsoft.com/office/drawing/2014/main" id="{05FF9C30-7938-4680-B58C-24F16A23426A}"/>
+                <a16:creationId xmlns="" xmlns:a16="http://schemas.microsoft.com/office/drawing/2014/main" id="{05FF9C30-7938-4680-B58C-24F16A23426A}"/>
               </a:ext>
             </a:extLst>
           </p:cNvPr>
@@ -4465,7 +4465,7 @@
           <p:cNvPr id="2" name="Symbol zastępczy daty 3">
             <a:extLst>
               <a:ext uri="{FF2B5EF4-FFF2-40B4-BE49-F238E27FC236}">
-                <a16:creationId xmlns:a16="http://schemas.microsoft.com/office/drawing/2014/main" id="{E39F76CC-3762-4DAB-91B7-25DA608986E7}"/>
+                <a16:creationId xmlns="" xmlns:a16="http://schemas.microsoft.com/office/drawing/2014/main" id="{E39F76CC-3762-4DAB-91B7-25DA608986E7}"/>
               </a:ext>
             </a:extLst>
           </p:cNvPr>
@@ -4501,7 +4501,7 @@
           <p:cNvPr id="3" name="Symbol zastępczy stopki 4">
             <a:extLst>
               <a:ext uri="{FF2B5EF4-FFF2-40B4-BE49-F238E27FC236}">
-                <a16:creationId xmlns:a16="http://schemas.microsoft.com/office/drawing/2014/main" id="{08B822BD-DB73-40BD-9A10-D90CACF5F560}"/>
+                <a16:creationId xmlns="" xmlns:a16="http://schemas.microsoft.com/office/drawing/2014/main" id="{08B822BD-DB73-40BD-9A10-D90CACF5F560}"/>
               </a:ext>
             </a:extLst>
           </p:cNvPr>
@@ -4537,7 +4537,7 @@
           <p:cNvPr id="4" name="Symbol zastępczy numeru slajdu 5">
             <a:extLst>
               <a:ext uri="{FF2B5EF4-FFF2-40B4-BE49-F238E27FC236}">
-                <a16:creationId xmlns:a16="http://schemas.microsoft.com/office/drawing/2014/main" id="{8C1A138D-B7B1-45F4-8E5F-CF67C96FAD6B}"/>
+                <a16:creationId xmlns="" xmlns:a16="http://schemas.microsoft.com/office/drawing/2014/main" id="{8C1A138D-B7B1-45F4-8E5F-CF67C96FAD6B}"/>
               </a:ext>
             </a:extLst>
           </p:cNvPr>
@@ -4786,7 +4786,7 @@
           <p:cNvPr id="5" name="Symbol zastępczy daty 3">
             <a:extLst>
               <a:ext uri="{FF2B5EF4-FFF2-40B4-BE49-F238E27FC236}">
-                <a16:creationId xmlns:a16="http://schemas.microsoft.com/office/drawing/2014/main" id="{221075F5-9717-4AD4-9F73-D98138DC5EC0}"/>
+                <a16:creationId xmlns="" xmlns:a16="http://schemas.microsoft.com/office/drawing/2014/main" id="{221075F5-9717-4AD4-9F73-D98138DC5EC0}"/>
               </a:ext>
             </a:extLst>
           </p:cNvPr>
@@ -4822,7 +4822,7 @@
           <p:cNvPr id="6" name="Symbol zastępczy stopki 4">
             <a:extLst>
               <a:ext uri="{FF2B5EF4-FFF2-40B4-BE49-F238E27FC236}">
-                <a16:creationId xmlns:a16="http://schemas.microsoft.com/office/drawing/2014/main" id="{528161BC-9F86-4B21-96FC-58EC33227881}"/>
+                <a16:creationId xmlns="" xmlns:a16="http://schemas.microsoft.com/office/drawing/2014/main" id="{528161BC-9F86-4B21-96FC-58EC33227881}"/>
               </a:ext>
             </a:extLst>
           </p:cNvPr>
@@ -4858,7 +4858,7 @@
           <p:cNvPr id="7" name="Symbol zastępczy numeru slajdu 5">
             <a:extLst>
               <a:ext uri="{FF2B5EF4-FFF2-40B4-BE49-F238E27FC236}">
-                <a16:creationId xmlns:a16="http://schemas.microsoft.com/office/drawing/2014/main" id="{B1BEAA1A-DABA-4EB2-A730-6813761823EF}"/>
+                <a16:creationId xmlns="" xmlns:a16="http://schemas.microsoft.com/office/drawing/2014/main" id="{B1BEAA1A-DABA-4EB2-A730-6813761823EF}"/>
               </a:ext>
             </a:extLst>
           </p:cNvPr>
@@ -5087,7 +5087,7 @@
           <p:cNvPr id="5" name="Symbol zastępczy daty 3">
             <a:extLst>
               <a:ext uri="{FF2B5EF4-FFF2-40B4-BE49-F238E27FC236}">
-                <a16:creationId xmlns:a16="http://schemas.microsoft.com/office/drawing/2014/main" id="{95A508E4-25E1-4B5E-83FF-4616D16EB542}"/>
+                <a16:creationId xmlns="" xmlns:a16="http://schemas.microsoft.com/office/drawing/2014/main" id="{95A508E4-25E1-4B5E-83FF-4616D16EB542}"/>
               </a:ext>
             </a:extLst>
           </p:cNvPr>
@@ -5123,7 +5123,7 @@
           <p:cNvPr id="6" name="Symbol zastępczy stopki 4">
             <a:extLst>
               <a:ext uri="{FF2B5EF4-FFF2-40B4-BE49-F238E27FC236}">
-                <a16:creationId xmlns:a16="http://schemas.microsoft.com/office/drawing/2014/main" id="{EB5B356B-03B1-450C-A2D0-02ACE6519F3B}"/>
+                <a16:creationId xmlns="" xmlns:a16="http://schemas.microsoft.com/office/drawing/2014/main" id="{EB5B356B-03B1-450C-A2D0-02ACE6519F3B}"/>
               </a:ext>
             </a:extLst>
           </p:cNvPr>
@@ -5159,7 +5159,7 @@
           <p:cNvPr id="7" name="Symbol zastępczy numeru slajdu 5">
             <a:extLst>
               <a:ext uri="{FF2B5EF4-FFF2-40B4-BE49-F238E27FC236}">
-                <a16:creationId xmlns:a16="http://schemas.microsoft.com/office/drawing/2014/main" id="{BC205F3A-3141-4245-A146-184827135164}"/>
+                <a16:creationId xmlns="" xmlns:a16="http://schemas.microsoft.com/office/drawing/2014/main" id="{BC205F3A-3141-4245-A146-184827135164}"/>
               </a:ext>
             </a:extLst>
           </p:cNvPr>
@@ -5236,7 +5236,7 @@
           <p:cNvPr id="1026" name="Symbol zastępczy tytułu 1">
             <a:extLst>
               <a:ext uri="{FF2B5EF4-FFF2-40B4-BE49-F238E27FC236}">
-                <a16:creationId xmlns:a16="http://schemas.microsoft.com/office/drawing/2014/main" id="{5F844AA4-E2DD-44CF-909F-98EB42A9BBE1}"/>
+                <a16:creationId xmlns="" xmlns:a16="http://schemas.microsoft.com/office/drawing/2014/main" id="{5F844AA4-E2DD-44CF-909F-98EB42A9BBE1}"/>
               </a:ext>
             </a:extLst>
           </p:cNvPr>
@@ -5300,7 +5300,7 @@
           <p:cNvPr id="1027" name="Symbol zastępczy tekstu 2">
             <a:extLst>
               <a:ext uri="{FF2B5EF4-FFF2-40B4-BE49-F238E27FC236}">
-                <a16:creationId xmlns:a16="http://schemas.microsoft.com/office/drawing/2014/main" id="{E83E7B25-6A89-4AAA-84E2-281CEB2EBA8B}"/>
+                <a16:creationId xmlns="" xmlns:a16="http://schemas.microsoft.com/office/drawing/2014/main" id="{E83E7B25-6A89-4AAA-84E2-281CEB2EBA8B}"/>
               </a:ext>
             </a:extLst>
           </p:cNvPr>
@@ -5392,7 +5392,7 @@
           <p:cNvPr id="4" name="Symbol zastępczy daty 3">
             <a:extLst>
               <a:ext uri="{FF2B5EF4-FFF2-40B4-BE49-F238E27FC236}">
-                <a16:creationId xmlns:a16="http://schemas.microsoft.com/office/drawing/2014/main" id="{A0BA7966-512E-4C35-A303-EC03F77BD6BF}"/>
+                <a16:creationId xmlns="" xmlns:a16="http://schemas.microsoft.com/office/drawing/2014/main" id="{A0BA7966-512E-4C35-A303-EC03F77BD6BF}"/>
               </a:ext>
             </a:extLst>
           </p:cNvPr>
@@ -5449,7 +5449,7 @@
           <p:cNvPr id="5" name="Symbol zastępczy stopki 4">
             <a:extLst>
               <a:ext uri="{FF2B5EF4-FFF2-40B4-BE49-F238E27FC236}">
-                <a16:creationId xmlns:a16="http://schemas.microsoft.com/office/drawing/2014/main" id="{8C1FE77D-BABE-49FE-9E17-24200490AA42}"/>
+                <a16:creationId xmlns="" xmlns:a16="http://schemas.microsoft.com/office/drawing/2014/main" id="{8C1FE77D-BABE-49FE-9E17-24200490AA42}"/>
               </a:ext>
             </a:extLst>
           </p:cNvPr>
@@ -5506,7 +5506,7 @@
           <p:cNvPr id="6" name="Symbol zastępczy numeru slajdu 5">
             <a:extLst>
               <a:ext uri="{FF2B5EF4-FFF2-40B4-BE49-F238E27FC236}">
-                <a16:creationId xmlns:a16="http://schemas.microsoft.com/office/drawing/2014/main" id="{0D3CA83B-9A09-48A9-A960-502DD2242CA1}"/>
+                <a16:creationId xmlns="" xmlns:a16="http://schemas.microsoft.com/office/drawing/2014/main" id="{0D3CA83B-9A09-48A9-A960-502DD2242CA1}"/>
               </a:ext>
             </a:extLst>
           </p:cNvPr>
@@ -5977,7 +5977,7 @@
           <p:cNvPr id="4098" name="Tytuł 1">
             <a:extLst>
               <a:ext uri="{FF2B5EF4-FFF2-40B4-BE49-F238E27FC236}">
-                <a16:creationId xmlns:a16="http://schemas.microsoft.com/office/drawing/2014/main" id="{B348D356-598C-4F0F-A191-75BA34253333}"/>
+                <a16:creationId xmlns="" xmlns:a16="http://schemas.microsoft.com/office/drawing/2014/main" id="{B348D356-598C-4F0F-A191-75BA34253333}"/>
               </a:ext>
             </a:extLst>
           </p:cNvPr>
@@ -6011,7 +6011,7 @@
           <p:cNvPr id="3" name="Content Placeholder 2">
             <a:extLst>
               <a:ext uri="{FF2B5EF4-FFF2-40B4-BE49-F238E27FC236}">
-                <a16:creationId xmlns:a16="http://schemas.microsoft.com/office/drawing/2014/main" id="{BCC39334-EA4F-4A11-B8C6-D12EA37D6301}"/>
+                <a16:creationId xmlns="" xmlns:a16="http://schemas.microsoft.com/office/drawing/2014/main" id="{BCC39334-EA4F-4A11-B8C6-D12EA37D6301}"/>
               </a:ext>
             </a:extLst>
           </p:cNvPr>
@@ -6041,14 +6041,14 @@
                 <a:gridCol w="2892669">
                   <a:extLst>
                     <a:ext uri="{9D8B030D-6E8A-4147-A177-3AD203B41FA5}">
-                      <a16:colId xmlns:a16="http://schemas.microsoft.com/office/drawing/2014/main" val="20000"/>
+                      <a16:colId xmlns="" xmlns:a16="http://schemas.microsoft.com/office/drawing/2014/main" val="20000"/>
                     </a:ext>
                   </a:extLst>
                 </a:gridCol>
                 <a:gridCol w="5336931">
                   <a:extLst>
                     <a:ext uri="{9D8B030D-6E8A-4147-A177-3AD203B41FA5}">
-                      <a16:colId xmlns:a16="http://schemas.microsoft.com/office/drawing/2014/main" val="20001"/>
+                      <a16:colId xmlns="" xmlns:a16="http://schemas.microsoft.com/office/drawing/2014/main" val="20001"/>
                     </a:ext>
                   </a:extLst>
                 </a:gridCol>
@@ -6085,7 +6085,7 @@
                 </a:tc>
                 <a:extLst>
                   <a:ext uri="{0D108BD9-81ED-4DB2-BD59-A6C34878D82A}">
-                    <a16:rowId xmlns:a16="http://schemas.microsoft.com/office/drawing/2014/main" val="10000"/>
+                    <a16:rowId xmlns="" xmlns:a16="http://schemas.microsoft.com/office/drawing/2014/main" val="10000"/>
                   </a:ext>
                 </a:extLst>
               </a:tr>
@@ -6120,7 +6120,7 @@
                 </a:tc>
                 <a:extLst>
                   <a:ext uri="{0D108BD9-81ED-4DB2-BD59-A6C34878D82A}">
-                    <a16:rowId xmlns:a16="http://schemas.microsoft.com/office/drawing/2014/main" val="10001"/>
+                    <a16:rowId xmlns="" xmlns:a16="http://schemas.microsoft.com/office/drawing/2014/main" val="10001"/>
                   </a:ext>
                 </a:extLst>
               </a:tr>
@@ -6160,7 +6160,7 @@
                 </a:tc>
                 <a:extLst>
                   <a:ext uri="{0D108BD9-81ED-4DB2-BD59-A6C34878D82A}">
-                    <a16:rowId xmlns:a16="http://schemas.microsoft.com/office/drawing/2014/main" val="10002"/>
+                    <a16:rowId xmlns="" xmlns:a16="http://schemas.microsoft.com/office/drawing/2014/main" val="10002"/>
                   </a:ext>
                 </a:extLst>
               </a:tr>
@@ -6204,7 +6204,7 @@
                 </a:tc>
                 <a:extLst>
                   <a:ext uri="{0D108BD9-81ED-4DB2-BD59-A6C34878D82A}">
-                    <a16:rowId xmlns:a16="http://schemas.microsoft.com/office/drawing/2014/main" val="10003"/>
+                    <a16:rowId xmlns="" xmlns:a16="http://schemas.microsoft.com/office/drawing/2014/main" val="10003"/>
                   </a:ext>
                 </a:extLst>
               </a:tr>
@@ -6269,7 +6269,7 @@
                 </a:tc>
                 <a:extLst>
                   <a:ext uri="{0D108BD9-81ED-4DB2-BD59-A6C34878D82A}">
-                    <a16:rowId xmlns:a16="http://schemas.microsoft.com/office/drawing/2014/main" val="10004"/>
+                    <a16:rowId xmlns="" xmlns:a16="http://schemas.microsoft.com/office/drawing/2014/main" val="10004"/>
                   </a:ext>
                 </a:extLst>
               </a:tr>
@@ -6282,7 +6282,7 @@
           <p:cNvPr id="4118" name="Symbol zastępczy numeru slajdu 3">
             <a:extLst>
               <a:ext uri="{FF2B5EF4-FFF2-40B4-BE49-F238E27FC236}">
-                <a16:creationId xmlns:a16="http://schemas.microsoft.com/office/drawing/2014/main" id="{CE8B9588-55EB-4F3F-9470-684DFABD27C7}"/>
+                <a16:creationId xmlns="" xmlns:a16="http://schemas.microsoft.com/office/drawing/2014/main" id="{CE8B9588-55EB-4F3F-9470-684DFABD27C7}"/>
               </a:ext>
             </a:extLst>
           </p:cNvPr>
@@ -6484,7 +6484,7 @@
           <p:cNvPr id="6" name="Symbol zastępczy daty 5">
             <a:extLst>
               <a:ext uri="{FF2B5EF4-FFF2-40B4-BE49-F238E27FC236}">
-                <a16:creationId xmlns:a16="http://schemas.microsoft.com/office/drawing/2014/main" id="{C4A5320C-99E4-4EFE-9781-35FAD00DAEB3}"/>
+                <a16:creationId xmlns="" xmlns:a16="http://schemas.microsoft.com/office/drawing/2014/main" id="{C4A5320C-99E4-4EFE-9781-35FAD00DAEB3}"/>
               </a:ext>
             </a:extLst>
           </p:cNvPr>
@@ -6516,7 +6516,7 @@
           <p:cNvPr id="7" name="Symbol zastępczy stopki 6">
             <a:extLst>
               <a:ext uri="{FF2B5EF4-FFF2-40B4-BE49-F238E27FC236}">
-                <a16:creationId xmlns:a16="http://schemas.microsoft.com/office/drawing/2014/main" id="{AA336492-9436-4D91-9843-A808C09D30CC}"/>
+                <a16:creationId xmlns="" xmlns:a16="http://schemas.microsoft.com/office/drawing/2014/main" id="{AA336492-9436-4D91-9843-A808C09D30CC}"/>
               </a:ext>
             </a:extLst>
           </p:cNvPr>
@@ -6548,7 +6548,7 @@
           <p:cNvPr id="4121" name="Group 4">
             <a:extLst>
               <a:ext uri="{FF2B5EF4-FFF2-40B4-BE49-F238E27FC236}">
-                <a16:creationId xmlns:a16="http://schemas.microsoft.com/office/drawing/2014/main" id="{C0BFB8C5-A429-4BD1-938D-5737F8BA5C4B}"/>
+                <a16:creationId xmlns="" xmlns:a16="http://schemas.microsoft.com/office/drawing/2014/main" id="{C0BFB8C5-A429-4BD1-938D-5737F8BA5C4B}"/>
               </a:ext>
             </a:extLst>
           </p:cNvPr>
@@ -6570,7 +6570,7 @@
             <p:cNvPr id="4122" name="Picture 1" descr="59a7622afc">
               <a:extLst>
                 <a:ext uri="{FF2B5EF4-FFF2-40B4-BE49-F238E27FC236}">
-                  <a16:creationId xmlns:a16="http://schemas.microsoft.com/office/drawing/2014/main" id="{8C9B6330-4B55-49BB-945C-B4D543B9D6AE}"/>
+                  <a16:creationId xmlns="" xmlns:a16="http://schemas.microsoft.com/office/drawing/2014/main" id="{8C9B6330-4B55-49BB-945C-B4D543B9D6AE}"/>
                 </a:ext>
               </a:extLst>
             </p:cNvPr>
@@ -6630,7 +6630,7 @@
             <p:cNvPr id="4123" name="Picture 2" descr="logo-eaiib">
               <a:extLst>
                 <a:ext uri="{FF2B5EF4-FFF2-40B4-BE49-F238E27FC236}">
-                  <a16:creationId xmlns:a16="http://schemas.microsoft.com/office/drawing/2014/main" id="{1ADB8374-8745-4327-91B8-2059ED249D4F}"/>
+                  <a16:creationId xmlns="" xmlns:a16="http://schemas.microsoft.com/office/drawing/2014/main" id="{1ADB8374-8745-4327-91B8-2059ED249D4F}"/>
                 </a:ext>
               </a:extLst>
             </p:cNvPr>
@@ -6690,7 +6690,7 @@
             <p:cNvPr id="4124" name="Picture 3">
               <a:extLst>
                 <a:ext uri="{FF2B5EF4-FFF2-40B4-BE49-F238E27FC236}">
-                  <a16:creationId xmlns:a16="http://schemas.microsoft.com/office/drawing/2014/main" id="{2F2B6BC0-F5DE-42B2-8472-302ECEF9CA12}"/>
+                  <a16:creationId xmlns="" xmlns:a16="http://schemas.microsoft.com/office/drawing/2014/main" id="{2F2B6BC0-F5DE-42B2-8472-302ECEF9CA12}"/>
                 </a:ext>
               </a:extLst>
             </p:cNvPr>
@@ -6750,7 +6750,7 @@
             <p:cNvPr id="4125" name="Obraz 3" descr="Opis: logo_autonomous_vehicle_color.png">
               <a:extLst>
                 <a:ext uri="{FF2B5EF4-FFF2-40B4-BE49-F238E27FC236}">
-                  <a16:creationId xmlns:a16="http://schemas.microsoft.com/office/drawing/2014/main" id="{CE9F685F-39ED-4C6B-835D-C7B77CD7F9EB}"/>
+                  <a16:creationId xmlns="" xmlns:a16="http://schemas.microsoft.com/office/drawing/2014/main" id="{CE9F685F-39ED-4C6B-835D-C7B77CD7F9EB}"/>
                 </a:ext>
               </a:extLst>
             </p:cNvPr>
@@ -6836,7 +6836,7 @@
           <p:cNvPr id="6146" name="Tytuł 1">
             <a:extLst>
               <a:ext uri="{FF2B5EF4-FFF2-40B4-BE49-F238E27FC236}">
-                <a16:creationId xmlns:a16="http://schemas.microsoft.com/office/drawing/2014/main" id="{ABF5A8D4-0581-44F3-9CA5-FAAE1588E46E}"/>
+                <a16:creationId xmlns="" xmlns:a16="http://schemas.microsoft.com/office/drawing/2014/main" id="{ABF5A8D4-0581-44F3-9CA5-FAAE1588E46E}"/>
               </a:ext>
             </a:extLst>
           </p:cNvPr>
@@ -6875,7 +6875,7 @@
           <p:cNvPr id="6147" name="Symbol zastępczy numeru slajdu 3">
             <a:extLst>
               <a:ext uri="{FF2B5EF4-FFF2-40B4-BE49-F238E27FC236}">
-                <a16:creationId xmlns:a16="http://schemas.microsoft.com/office/drawing/2014/main" id="{47E35F72-7969-4C40-BCC0-8236643FCD8E}"/>
+                <a16:creationId xmlns="" xmlns:a16="http://schemas.microsoft.com/office/drawing/2014/main" id="{47E35F72-7969-4C40-BCC0-8236643FCD8E}"/>
               </a:ext>
             </a:extLst>
           </p:cNvPr>
@@ -7077,7 +7077,7 @@
           <p:cNvPr id="6" name="Symbol zastępczy daty 5">
             <a:extLst>
               <a:ext uri="{FF2B5EF4-FFF2-40B4-BE49-F238E27FC236}">
-                <a16:creationId xmlns:a16="http://schemas.microsoft.com/office/drawing/2014/main" id="{D63DD4DE-E50C-4CA2-83AC-2E642E2F2E00}"/>
+                <a16:creationId xmlns="" xmlns:a16="http://schemas.microsoft.com/office/drawing/2014/main" id="{D63DD4DE-E50C-4CA2-83AC-2E642E2F2E00}"/>
               </a:ext>
             </a:extLst>
           </p:cNvPr>
@@ -7109,7 +7109,7 @@
           <p:cNvPr id="7" name="Symbol zastępczy stopki 6">
             <a:extLst>
               <a:ext uri="{FF2B5EF4-FFF2-40B4-BE49-F238E27FC236}">
-                <a16:creationId xmlns:a16="http://schemas.microsoft.com/office/drawing/2014/main" id="{91C936D9-8223-4393-8CBD-59AD40AD4EB5}"/>
+                <a16:creationId xmlns="" xmlns:a16="http://schemas.microsoft.com/office/drawing/2014/main" id="{91C936D9-8223-4393-8CBD-59AD40AD4EB5}"/>
               </a:ext>
             </a:extLst>
           </p:cNvPr>
@@ -7136,14 +7136,14 @@
           </a:p>
         </p:txBody>
       </p:sp>
-      <mc:AlternateContent xmlns:mc="http://schemas.openxmlformats.org/markup-compatibility/2006">
-        <mc:Choice xmlns:a14="http://schemas.microsoft.com/office/drawing/2010/main" Requires="a14">
+      <mc:AlternateContent xmlns:mc="http://schemas.openxmlformats.org/markup-compatibility/2006" xmlns:a14="http://schemas.microsoft.com/office/drawing/2010/main">
+        <mc:Choice Requires="a14">
           <p:sp>
             <p:nvSpPr>
               <p:cNvPr id="3" name="Prostokąt 2">
                 <a:extLst>
                   <a:ext uri="{FF2B5EF4-FFF2-40B4-BE49-F238E27FC236}">
-                    <a16:creationId xmlns:a16="http://schemas.microsoft.com/office/drawing/2014/main" id="{9D86CE73-4CE2-4C50-81C0-35C1E195F2DA}"/>
+                    <a16:creationId xmlns="" xmlns:a16="http://schemas.microsoft.com/office/drawing/2014/main" id="{9D86CE73-4CE2-4C50-81C0-35C1E195F2DA}"/>
                   </a:ext>
                 </a:extLst>
               </p:cNvPr>
@@ -7190,7 +7190,7 @@
                         <m:sSubPr>
                           <m:ctrlPr>
                             <a:rPr lang="pl-PL" sz="1600" i="1">
-                              <a:latin typeface="Cambria Math" panose="02040503050406030204" pitchFamily="18" charset="0"/>
+                              <a:latin typeface="Cambria Math"/>
                             </a:rPr>
                           </m:ctrlPr>
                         </m:sSubPr>
@@ -7215,7 +7215,7 @@
                         <m:sSubPr>
                           <m:ctrlPr>
                             <a:rPr lang="pl-PL" sz="1600" i="1">
-                              <a:latin typeface="Cambria Math" panose="02040503050406030204" pitchFamily="18" charset="0"/>
+                              <a:latin typeface="Cambria Math"/>
                             </a:rPr>
                           </m:ctrlPr>
                         </m:sSubPr>
@@ -7225,7 +7225,7 @@
                               <m:chr m:val="̈"/>
                               <m:ctrlPr>
                                 <a:rPr lang="pl-PL" sz="1600" i="1">
-                                  <a:latin typeface="Cambria Math" panose="02040503050406030204" pitchFamily="18" charset="0"/>
+                                  <a:latin typeface="Cambria Math"/>
                                 </a:rPr>
                               </m:ctrlPr>
                             </m:accPr>
@@ -7252,7 +7252,7 @@
                         <m:dPr>
                           <m:ctrlPr>
                             <a:rPr lang="pl-PL" sz="1600" i="1">
-                              <a:latin typeface="Cambria Math" panose="02040503050406030204" pitchFamily="18" charset="0"/>
+                              <a:latin typeface="Cambria Math"/>
                             </a:rPr>
                           </m:ctrlPr>
                         </m:dPr>
@@ -7275,7 +7275,7 @@
                         <m:sSubPr>
                           <m:ctrlPr>
                             <a:rPr lang="pl-PL" sz="1600" i="1">
-                              <a:latin typeface="Cambria Math" panose="02040503050406030204" pitchFamily="18" charset="0"/>
+                              <a:latin typeface="Cambria Math"/>
                             </a:rPr>
                           </m:ctrlPr>
                         </m:sSubPr>
@@ -7300,7 +7300,7 @@
                         <m:dPr>
                           <m:ctrlPr>
                             <a:rPr lang="pl-PL" sz="1600" i="1">
-                              <a:latin typeface="Cambria Math" panose="02040503050406030204" pitchFamily="18" charset="0"/>
+                              <a:latin typeface="Cambria Math"/>
                             </a:rPr>
                           </m:ctrlPr>
                         </m:dPr>
@@ -7315,7 +7315,7 @@
                             <m:sSubPr>
                               <m:ctrlPr>
                                 <a:rPr lang="pl-PL" sz="1600" i="1">
-                                  <a:latin typeface="Cambria Math" panose="02040503050406030204" pitchFamily="18" charset="0"/>
+                                  <a:latin typeface="Cambria Math"/>
                                 </a:rPr>
                               </m:ctrlPr>
                             </m:sSubPr>
@@ -7325,7 +7325,7 @@
                                   <m:chr m:val="̇"/>
                                   <m:ctrlPr>
                                     <a:rPr lang="pl-PL" sz="1600" i="1">
-                                      <a:latin typeface="Cambria Math" panose="02040503050406030204" pitchFamily="18" charset="0"/>
+                                      <a:latin typeface="Cambria Math"/>
                                     </a:rPr>
                                   </m:ctrlPr>
                                 </m:accPr>
@@ -7352,7 +7352,7 @@
                             <m:dPr>
                               <m:ctrlPr>
                                 <a:rPr lang="pl-PL" sz="1600" i="1">
-                                  <a:latin typeface="Cambria Math" panose="02040503050406030204" pitchFamily="18" charset="0"/>
+                                  <a:latin typeface="Cambria Math"/>
                                 </a:rPr>
                               </m:ctrlPr>
                             </m:dPr>
@@ -7375,7 +7375,7 @@
                             <m:sSubPr>
                               <m:ctrlPr>
                                 <a:rPr lang="pl-PL" sz="1600" i="1">
-                                  <a:latin typeface="Cambria Math" panose="02040503050406030204" pitchFamily="18" charset="0"/>
+                                  <a:latin typeface="Cambria Math"/>
                                 </a:rPr>
                               </m:ctrlPr>
                             </m:sSubPr>
@@ -7385,7 +7385,7 @@
                                   <m:chr m:val="̇"/>
                                   <m:ctrlPr>
                                     <a:rPr lang="pl-PL" sz="1600" i="1">
-                                      <a:latin typeface="Cambria Math" panose="02040503050406030204" pitchFamily="18" charset="0"/>
+                                      <a:latin typeface="Cambria Math"/>
                                     </a:rPr>
                                   </m:ctrlPr>
                                 </m:accPr>
@@ -7412,7 +7412,7 @@
                             <m:dPr>
                               <m:ctrlPr>
                                 <a:rPr lang="pl-PL" sz="1600" i="1">
-                                  <a:latin typeface="Cambria Math" panose="02040503050406030204" pitchFamily="18" charset="0"/>
+                                  <a:latin typeface="Cambria Math"/>
                                 </a:rPr>
                               </m:ctrlPr>
                             </m:dPr>
@@ -7437,7 +7437,7 @@
                         <m:sSubPr>
                           <m:ctrlPr>
                             <a:rPr lang="pl-PL" sz="1600" i="1">
-                              <a:latin typeface="Cambria Math" panose="02040503050406030204" pitchFamily="18" charset="0"/>
+                              <a:latin typeface="Cambria Math"/>
                             </a:rPr>
                           </m:ctrlPr>
                         </m:sSubPr>
@@ -7462,7 +7462,7 @@
                         <m:dPr>
                           <m:ctrlPr>
                             <a:rPr lang="pl-PL" sz="1600" i="1">
-                              <a:latin typeface="Cambria Math" panose="02040503050406030204" pitchFamily="18" charset="0"/>
+                              <a:latin typeface="Cambria Math"/>
                             </a:rPr>
                           </m:ctrlPr>
                         </m:dPr>
@@ -7471,7 +7471,7 @@
                             <m:sSubPr>
                               <m:ctrlPr>
                                 <a:rPr lang="pl-PL" sz="1600" i="1">
-                                  <a:latin typeface="Cambria Math" panose="02040503050406030204" pitchFamily="18" charset="0"/>
+                                  <a:latin typeface="Cambria Math"/>
                                 </a:rPr>
                               </m:ctrlPr>
                             </m:sSubPr>
@@ -7496,7 +7496,7 @@
                             <m:dPr>
                               <m:ctrlPr>
                                 <a:rPr lang="pl-PL" sz="1600" i="1">
-                                  <a:latin typeface="Cambria Math" panose="02040503050406030204" pitchFamily="18" charset="0"/>
+                                  <a:latin typeface="Cambria Math"/>
                                 </a:rPr>
                               </m:ctrlPr>
                             </m:dPr>
@@ -7519,7 +7519,7 @@
                             <m:sSubPr>
                               <m:ctrlPr>
                                 <a:rPr lang="pl-PL" sz="1600" i="1">
-                                  <a:latin typeface="Cambria Math" panose="02040503050406030204" pitchFamily="18" charset="0"/>
+                                  <a:latin typeface="Cambria Math"/>
                                 </a:rPr>
                               </m:ctrlPr>
                             </m:sSubPr>
@@ -7544,7 +7544,7 @@
                             <m:dPr>
                               <m:ctrlPr>
                                 <a:rPr lang="pl-PL" sz="1600" i="1">
-                                  <a:latin typeface="Cambria Math" panose="02040503050406030204" pitchFamily="18" charset="0"/>
+                                  <a:latin typeface="Cambria Math"/>
                                 </a:rPr>
                               </m:ctrlPr>
                             </m:dPr>
@@ -7575,7 +7575,7 @@
                         <m:dPr>
                           <m:ctrlPr>
                             <a:rPr lang="pl-PL" sz="1600" i="1">
-                              <a:latin typeface="Cambria Math" panose="02040503050406030204" pitchFamily="18" charset="0"/>
+                              <a:latin typeface="Cambria Math"/>
                             </a:rPr>
                           </m:ctrlPr>
                         </m:dPr>
@@ -7601,7 +7601,7 @@
                       <m:sSubPr>
                         <m:ctrlPr>
                           <a:rPr lang="pl-PL" sz="1600" i="1">
-                            <a:latin typeface="Cambria Math" panose="02040503050406030204" pitchFamily="18" charset="0"/>
+                            <a:latin typeface="Cambria Math"/>
                           </a:rPr>
                         </m:ctrlPr>
                       </m:sSubPr>
@@ -7626,7 +7626,7 @@
                       <m:sSubPr>
                         <m:ctrlPr>
                           <a:rPr lang="pl-PL" sz="1600" i="1">
-                            <a:latin typeface="Cambria Math" panose="02040503050406030204" pitchFamily="18" charset="0"/>
+                            <a:latin typeface="Cambria Math"/>
                           </a:rPr>
                         </m:ctrlPr>
                       </m:sSubPr>
@@ -7636,7 +7636,7 @@
                             <m:chr m:val="̈"/>
                             <m:ctrlPr>
                               <a:rPr lang="pl-PL" sz="1600" i="1">
-                                <a:latin typeface="Cambria Math" panose="02040503050406030204" pitchFamily="18" charset="0"/>
+                                <a:latin typeface="Cambria Math"/>
                               </a:rPr>
                             </m:ctrlPr>
                           </m:accPr>
@@ -7663,7 +7663,7 @@
                       <m:dPr>
                         <m:ctrlPr>
                           <a:rPr lang="pl-PL" sz="1600" i="1">
-                            <a:latin typeface="Cambria Math" panose="02040503050406030204" pitchFamily="18" charset="0"/>
+                            <a:latin typeface="Cambria Math"/>
                           </a:rPr>
                         </m:ctrlPr>
                       </m:dPr>
@@ -7686,7 +7686,7 @@
                       <m:sSubPr>
                         <m:ctrlPr>
                           <a:rPr lang="pl-PL" sz="1600" i="1">
-                            <a:latin typeface="Cambria Math" panose="02040503050406030204" pitchFamily="18" charset="0"/>
+                            <a:latin typeface="Cambria Math"/>
                           </a:rPr>
                         </m:ctrlPr>
                       </m:sSubPr>
@@ -7711,7 +7711,7 @@
                       <m:dPr>
                         <m:ctrlPr>
                           <a:rPr lang="pl-PL" sz="1600" i="1">
-                            <a:latin typeface="Cambria Math" panose="02040503050406030204" pitchFamily="18" charset="0"/>
+                            <a:latin typeface="Cambria Math"/>
                           </a:rPr>
                         </m:ctrlPr>
                       </m:dPr>
@@ -7726,7 +7726,7 @@
                           <m:sSubPr>
                             <m:ctrlPr>
                               <a:rPr lang="pl-PL" sz="1600" i="1">
-                                <a:latin typeface="Cambria Math" panose="02040503050406030204" pitchFamily="18" charset="0"/>
+                                <a:latin typeface="Cambria Math"/>
                               </a:rPr>
                             </m:ctrlPr>
                           </m:sSubPr>
@@ -7736,7 +7736,7 @@
                                 <m:chr m:val="̇"/>
                                 <m:ctrlPr>
                                   <a:rPr lang="pl-PL" sz="1600" i="1">
-                                    <a:latin typeface="Cambria Math" panose="02040503050406030204" pitchFamily="18" charset="0"/>
+                                    <a:latin typeface="Cambria Math"/>
                                   </a:rPr>
                                 </m:ctrlPr>
                               </m:accPr>
@@ -7763,7 +7763,7 @@
                           <m:dPr>
                             <m:ctrlPr>
                               <a:rPr lang="pl-PL" sz="1600" i="1">
-                                <a:latin typeface="Cambria Math" panose="02040503050406030204" pitchFamily="18" charset="0"/>
+                                <a:latin typeface="Cambria Math"/>
                               </a:rPr>
                             </m:ctrlPr>
                           </m:dPr>
@@ -7786,7 +7786,7 @@
                           <m:sSubPr>
                             <m:ctrlPr>
                               <a:rPr lang="pl-PL" sz="1600" i="1">
-                                <a:latin typeface="Cambria Math" panose="02040503050406030204" pitchFamily="18" charset="0"/>
+                                <a:latin typeface="Cambria Math"/>
                               </a:rPr>
                             </m:ctrlPr>
                           </m:sSubPr>
@@ -7796,7 +7796,7 @@
                                 <m:chr m:val="̇"/>
                                 <m:ctrlPr>
                                   <a:rPr lang="pl-PL" sz="1600" i="1">
-                                    <a:latin typeface="Cambria Math" panose="02040503050406030204" pitchFamily="18" charset="0"/>
+                                    <a:latin typeface="Cambria Math"/>
                                   </a:rPr>
                                 </m:ctrlPr>
                               </m:accPr>
@@ -7823,7 +7823,7 @@
                           <m:dPr>
                             <m:ctrlPr>
                               <a:rPr lang="pl-PL" sz="1600" i="1">
-                                <a:latin typeface="Cambria Math" panose="02040503050406030204" pitchFamily="18" charset="0"/>
+                                <a:latin typeface="Cambria Math"/>
                               </a:rPr>
                             </m:ctrlPr>
                           </m:dPr>
@@ -7848,7 +7848,7 @@
                       <m:sSubPr>
                         <m:ctrlPr>
                           <a:rPr lang="pl-PL" sz="1600" i="1">
-                            <a:latin typeface="Cambria Math" panose="02040503050406030204" pitchFamily="18" charset="0"/>
+                            <a:latin typeface="Cambria Math"/>
                           </a:rPr>
                         </m:ctrlPr>
                       </m:sSubPr>
@@ -7873,7 +7873,7 @@
                       <m:dPr>
                         <m:ctrlPr>
                           <a:rPr lang="pl-PL" sz="1600" i="1">
-                            <a:latin typeface="Cambria Math" panose="02040503050406030204" pitchFamily="18" charset="0"/>
+                            <a:latin typeface="Cambria Math"/>
                           </a:rPr>
                         </m:ctrlPr>
                       </m:dPr>
@@ -7888,7 +7888,7 @@
                           <m:sSubPr>
                             <m:ctrlPr>
                               <a:rPr lang="pl-PL" sz="1600" i="1">
-                                <a:latin typeface="Cambria Math" panose="02040503050406030204" pitchFamily="18" charset="0"/>
+                                <a:latin typeface="Cambria Math"/>
                               </a:rPr>
                             </m:ctrlPr>
                           </m:sSubPr>
@@ -7898,7 +7898,7 @@
                                 <m:chr m:val="̇"/>
                                 <m:ctrlPr>
                                   <a:rPr lang="pl-PL" sz="1600" i="1">
-                                    <a:latin typeface="Cambria Math" panose="02040503050406030204" pitchFamily="18" charset="0"/>
+                                    <a:latin typeface="Cambria Math"/>
                                   </a:rPr>
                                 </m:ctrlPr>
                               </m:accPr>
@@ -7925,7 +7925,7 @@
                           <m:dPr>
                             <m:ctrlPr>
                               <a:rPr lang="pl-PL" sz="1600" i="1">
-                                <a:latin typeface="Cambria Math" panose="02040503050406030204" pitchFamily="18" charset="0"/>
+                                <a:latin typeface="Cambria Math"/>
                               </a:rPr>
                             </m:ctrlPr>
                           </m:dPr>
@@ -7948,7 +7948,7 @@
                           <m:sSubPr>
                             <m:ctrlPr>
                               <a:rPr lang="pl-PL" sz="1600" i="1">
-                                <a:latin typeface="Cambria Math" panose="02040503050406030204" pitchFamily="18" charset="0"/>
+                                <a:latin typeface="Cambria Math"/>
                               </a:rPr>
                             </m:ctrlPr>
                           </m:sSubPr>
@@ -7958,7 +7958,7 @@
                                 <m:chr m:val="̇"/>
                                 <m:ctrlPr>
                                   <a:rPr lang="pl-PL" sz="1600" i="1">
-                                    <a:latin typeface="Cambria Math" panose="02040503050406030204" pitchFamily="18" charset="0"/>
+                                    <a:latin typeface="Cambria Math"/>
                                   </a:rPr>
                                 </m:ctrlPr>
                               </m:accPr>
@@ -7985,7 +7985,7 @@
                           <m:dPr>
                             <m:ctrlPr>
                               <a:rPr lang="pl-PL" sz="1600" i="1">
-                                <a:latin typeface="Cambria Math" panose="02040503050406030204" pitchFamily="18" charset="0"/>
+                                <a:latin typeface="Cambria Math"/>
                               </a:rPr>
                             </m:ctrlPr>
                           </m:dPr>
@@ -8010,7 +8010,7 @@
                       <m:sSubPr>
                         <m:ctrlPr>
                           <a:rPr lang="pl-PL" sz="1600" i="1">
-                            <a:latin typeface="Cambria Math" panose="02040503050406030204" pitchFamily="18" charset="0"/>
+                            <a:latin typeface="Cambria Math"/>
                           </a:rPr>
                         </m:ctrlPr>
                       </m:sSubPr>
@@ -8035,7 +8035,7 @@
                       <m:dPr>
                         <m:ctrlPr>
                           <a:rPr lang="pl-PL" sz="1600" i="1">
-                            <a:latin typeface="Cambria Math" panose="02040503050406030204" pitchFamily="18" charset="0"/>
+                            <a:latin typeface="Cambria Math"/>
                           </a:rPr>
                         </m:ctrlPr>
                       </m:dPr>
@@ -8044,7 +8044,7 @@
                           <m:sSubPr>
                             <m:ctrlPr>
                               <a:rPr lang="pl-PL" sz="1600" i="1">
-                                <a:latin typeface="Cambria Math" panose="02040503050406030204" pitchFamily="18" charset="0"/>
+                                <a:latin typeface="Cambria Math"/>
                               </a:rPr>
                             </m:ctrlPr>
                           </m:sSubPr>
@@ -8069,7 +8069,7 @@
                           <m:dPr>
                             <m:ctrlPr>
                               <a:rPr lang="pl-PL" sz="1600" i="1">
-                                <a:latin typeface="Cambria Math" panose="02040503050406030204" pitchFamily="18" charset="0"/>
+                                <a:latin typeface="Cambria Math"/>
                               </a:rPr>
                             </m:ctrlPr>
                           </m:dPr>
@@ -8092,7 +8092,7 @@
                           <m:sSubPr>
                             <m:ctrlPr>
                               <a:rPr lang="pl-PL" sz="1600" i="1">
-                                <a:latin typeface="Cambria Math" panose="02040503050406030204" pitchFamily="18" charset="0"/>
+                                <a:latin typeface="Cambria Math"/>
                               </a:rPr>
                             </m:ctrlPr>
                           </m:sSubPr>
@@ -8117,7 +8117,7 @@
                           <m:dPr>
                             <m:ctrlPr>
                               <a:rPr lang="pl-PL" sz="1600" i="1">
-                                <a:latin typeface="Cambria Math" panose="02040503050406030204" pitchFamily="18" charset="0"/>
+                                <a:latin typeface="Cambria Math"/>
                               </a:rPr>
                             </m:ctrlPr>
                           </m:dPr>
@@ -8142,7 +8142,7 @@
                       <m:sSubPr>
                         <m:ctrlPr>
                           <a:rPr lang="pl-PL" sz="1600" i="1">
-                            <a:latin typeface="Cambria Math" panose="02040503050406030204" pitchFamily="18" charset="0"/>
+                            <a:latin typeface="Cambria Math"/>
                           </a:rPr>
                         </m:ctrlPr>
                       </m:sSubPr>
@@ -8173,7 +8173,7 @@
                       <m:sSubPr>
                         <m:ctrlPr>
                           <a:rPr lang="pl-PL" sz="1600" i="1">
-                            <a:latin typeface="Cambria Math" panose="02040503050406030204" pitchFamily="18" charset="0"/>
+                            <a:latin typeface="Cambria Math"/>
                           </a:rPr>
                         </m:ctrlPr>
                       </m:sSubPr>
@@ -8198,7 +8198,7 @@
                       <m:dPr>
                         <m:ctrlPr>
                           <a:rPr lang="pl-PL" sz="1600" i="1">
-                            <a:latin typeface="Cambria Math" panose="02040503050406030204" pitchFamily="18" charset="0"/>
+                            <a:latin typeface="Cambria Math"/>
                           </a:rPr>
                         </m:ctrlPr>
                       </m:dPr>
@@ -8221,7 +8221,7 @@
                       <m:sSubPr>
                         <m:ctrlPr>
                           <a:rPr lang="pl-PL" sz="1600" i="1">
-                            <a:latin typeface="Cambria Math" panose="02040503050406030204" pitchFamily="18" charset="0"/>
+                            <a:latin typeface="Cambria Math"/>
                           </a:rPr>
                         </m:ctrlPr>
                       </m:sSubPr>
@@ -8246,7 +8246,7 @@
                       <m:dPr>
                         <m:ctrlPr>
                           <a:rPr lang="pl-PL" sz="1600" i="1">
-                            <a:latin typeface="Cambria Math" panose="02040503050406030204" pitchFamily="18" charset="0"/>
+                            <a:latin typeface="Cambria Math"/>
                           </a:rPr>
                         </m:ctrlPr>
                       </m:dPr>
@@ -8263,19 +8263,7 @@
                       <a:rPr lang="pl-PL" sz="1600" i="1">
                         <a:latin typeface="Cambria Math" panose="02040503050406030204" pitchFamily="18" charset="0"/>
                       </a:rPr>
-                      <m:t>)</m:t>
-                    </m:r>
-                    <m:r>
-                      <a:rPr lang="pl-PL" sz="1600" i="1">
-                        <a:latin typeface="Cambria Math" panose="02040503050406030204" pitchFamily="18" charset="0"/>
-                      </a:rPr>
-                      <m:t>=</m:t>
-                    </m:r>
-                    <m:r>
-                      <a:rPr lang="pl-PL" sz="1600" i="1">
-                        <a:latin typeface="Cambria Math" panose="02040503050406030204" pitchFamily="18" charset="0"/>
-                      </a:rPr>
-                      <m:t>−</m:t>
+                      <m:t>)=−</m:t>
                     </m:r>
                     <m:r>
                       <a:rPr lang="pl-PL" sz="1600" i="1">
@@ -8287,7 +8275,7 @@
                       <m:dPr>
                         <m:ctrlPr>
                           <a:rPr lang="pl-PL" sz="1600" i="1">
-                            <a:latin typeface="Cambria Math" panose="02040503050406030204" pitchFamily="18" charset="0"/>
+                            <a:latin typeface="Cambria Math"/>
                           </a:rPr>
                         </m:ctrlPr>
                       </m:dPr>
@@ -8322,7 +8310,7 @@
                       <m:sSubPr>
                         <m:ctrlPr>
                           <a:rPr lang="pl-PL" sz="1600" i="1" dirty="0">
-                            <a:latin typeface="Cambria Math" panose="02040503050406030204" pitchFamily="18" charset="0"/>
+                            <a:latin typeface="Cambria Math"/>
                           </a:rPr>
                         </m:ctrlPr>
                       </m:sSubPr>
@@ -8358,7 +8346,7 @@
                       <m:sSubPr>
                         <m:ctrlPr>
                           <a:rPr lang="pl-PL" sz="1600" i="1" dirty="0">
-                            <a:latin typeface="Cambria Math" panose="02040503050406030204" pitchFamily="18" charset="0"/>
+                            <a:latin typeface="Cambria Math"/>
                           </a:rPr>
                         </m:ctrlPr>
                       </m:sSubPr>
@@ -8391,7 +8379,7 @@
                       <m:sSubPr>
                         <m:ctrlPr>
                           <a:rPr lang="pl-PL" sz="1600" i="1">
-                            <a:latin typeface="Cambria Math" panose="02040503050406030204" pitchFamily="18" charset="0"/>
+                            <a:latin typeface="Cambria Math"/>
                           </a:rPr>
                         </m:ctrlPr>
                       </m:sSubPr>
@@ -8424,7 +8412,7 @@
                       <m:sSubPr>
                         <m:ctrlPr>
                           <a:rPr lang="pl-PL" sz="1600" i="1">
-                            <a:latin typeface="Cambria Math" panose="02040503050406030204" pitchFamily="18" charset="0"/>
+                            <a:latin typeface="Cambria Math"/>
                           </a:rPr>
                         </m:ctrlPr>
                       </m:sSubPr>
@@ -8457,7 +8445,7 @@
                       <m:sSubPr>
                         <m:ctrlPr>
                           <a:rPr lang="pl-PL" sz="1600" i="1">
-                            <a:latin typeface="Cambria Math" panose="02040503050406030204" pitchFamily="18" charset="0"/>
+                            <a:latin typeface="Cambria Math"/>
                           </a:rPr>
                         </m:ctrlPr>
                       </m:sSubPr>
@@ -8490,7 +8478,7 @@
                       <m:sSubPr>
                         <m:ctrlPr>
                           <a:rPr lang="pl-PL" sz="1600" i="1">
-                            <a:latin typeface="Cambria Math" panose="02040503050406030204" pitchFamily="18" charset="0"/>
+                            <a:latin typeface="Cambria Math"/>
                           </a:rPr>
                         </m:ctrlPr>
                       </m:sSubPr>
@@ -8523,7 +8511,7 @@
                       <m:sSubPr>
                         <m:ctrlPr>
                           <a:rPr lang="pl-PL" sz="1600" i="1" dirty="0">
-                            <a:latin typeface="Cambria Math" panose="02040503050406030204" pitchFamily="18" charset="0"/>
+                            <a:latin typeface="Cambria Math"/>
                           </a:rPr>
                         </m:ctrlPr>
                       </m:sSubPr>
@@ -8548,7 +8536,7 @@
                       <m:dPr>
                         <m:ctrlPr>
                           <a:rPr lang="pl-PL" sz="1600" i="1" dirty="0">
-                            <a:latin typeface="Cambria Math" panose="02040503050406030204" pitchFamily="18" charset="0"/>
+                            <a:latin typeface="Cambria Math"/>
                           </a:rPr>
                         </m:ctrlPr>
                       </m:dPr>
@@ -8579,7 +8567,7 @@
                       <m:sSubPr>
                         <m:ctrlPr>
                           <a:rPr lang="pl-PL" sz="1600" i="1" dirty="0" err="1">
-                            <a:latin typeface="Cambria Math" panose="02040503050406030204" pitchFamily="18" charset="0"/>
+                            <a:latin typeface="Cambria Math"/>
                           </a:rPr>
                         </m:ctrlPr>
                       </m:sSubPr>
@@ -8630,7 +8618,7 @@
                       <m:sSubPr>
                         <m:ctrlPr>
                           <a:rPr lang="pl-PL" sz="1600" i="1" dirty="0">
-                            <a:latin typeface="Cambria Math" panose="02040503050406030204" pitchFamily="18" charset="0"/>
+                            <a:latin typeface="Cambria Math"/>
                           </a:rPr>
                         </m:ctrlPr>
                       </m:sSubPr>
@@ -8687,7 +8675,7 @@
                       <m:dPr>
                         <m:ctrlPr>
                           <a:rPr lang="pl-PL" sz="1600" i="1">
-                            <a:latin typeface="Cambria Math" panose="02040503050406030204" pitchFamily="18" charset="0"/>
+                            <a:latin typeface="Cambria Math"/>
                           </a:rPr>
                         </m:ctrlPr>
                       </m:dPr>
@@ -8741,7 +8729,7 @@
                       <m:sSubPr>
                         <m:ctrlPr>
                           <a:rPr lang="pl-PL" sz="1600" b="0" i="1" smtClean="0">
-                            <a:latin typeface="Cambria Math" panose="02040503050406030204" pitchFamily="18" charset="0"/>
+                            <a:latin typeface="Cambria Math"/>
                           </a:rPr>
                         </m:ctrlPr>
                       </m:sSubPr>
@@ -8772,7 +8760,7 @@
                       <m:dPr>
                         <m:ctrlPr>
                           <a:rPr lang="pl-PL" sz="1600" b="0" i="1" smtClean="0">
-                            <a:latin typeface="Cambria Math" panose="02040503050406030204" pitchFamily="18" charset="0"/>
+                            <a:latin typeface="Cambria Math"/>
                           </a:rPr>
                         </m:ctrlPr>
                       </m:dPr>
@@ -8810,7 +8798,7 @@
                       <m:sSubPr>
                         <m:ctrlPr>
                           <a:rPr lang="pl-PL" sz="1600" i="1">
-                            <a:latin typeface="Cambria Math" panose="02040503050406030204" pitchFamily="18" charset="0"/>
+                            <a:latin typeface="Cambria Math"/>
                           </a:rPr>
                         </m:ctrlPr>
                       </m:sSubPr>
@@ -8835,7 +8823,7 @@
                       <m:dPr>
                         <m:ctrlPr>
                           <a:rPr lang="pl-PL" sz="1600" i="1">
-                            <a:latin typeface="Cambria Math" panose="02040503050406030204" pitchFamily="18" charset="0"/>
+                            <a:latin typeface="Cambria Math"/>
                           </a:rPr>
                         </m:ctrlPr>
                       </m:dPr>
@@ -8881,7 +8869,7 @@
                       <m:sSubPr>
                         <m:ctrlPr>
                           <a:rPr lang="pl-PL" sz="1600" i="1">
-                            <a:latin typeface="Cambria Math" panose="02040503050406030204" pitchFamily="18" charset="0"/>
+                            <a:latin typeface="Cambria Math"/>
                           </a:rPr>
                         </m:ctrlPr>
                       </m:sSubPr>
@@ -8891,7 +8879,7 @@
                             <m:chr m:val="̇"/>
                             <m:ctrlPr>
                               <a:rPr lang="pl-PL" sz="1600" i="1">
-                                <a:latin typeface="Cambria Math" panose="02040503050406030204" pitchFamily="18" charset="0"/>
+                                <a:latin typeface="Cambria Math"/>
                               </a:rPr>
                             </m:ctrlPr>
                           </m:accPr>
@@ -8918,7 +8906,7 @@
                       <m:dPr>
                         <m:ctrlPr>
                           <a:rPr lang="pl-PL" sz="1600" i="1">
-                            <a:latin typeface="Cambria Math" panose="02040503050406030204" pitchFamily="18" charset="0"/>
+                            <a:latin typeface="Cambria Math"/>
                           </a:rPr>
                         </m:ctrlPr>
                       </m:dPr>
@@ -8970,7 +8958,7 @@
                         <m:dPr>
                           <m:ctrlPr>
                             <a:rPr lang="pl-PL" sz="1600" i="1">
-                              <a:latin typeface="Cambria Math" panose="02040503050406030204" pitchFamily="18" charset="0"/>
+                              <a:latin typeface="Cambria Math"/>
                             </a:rPr>
                           </m:ctrlPr>
                         </m:dPr>
@@ -8999,7 +8987,7 @@
                         <m:dPr>
                           <m:ctrlPr>
                             <a:rPr lang="pl-PL" sz="1600" i="1">
-                              <a:latin typeface="Cambria Math" panose="02040503050406030204" pitchFamily="18" charset="0"/>
+                              <a:latin typeface="Cambria Math"/>
                             </a:rPr>
                           </m:ctrlPr>
                         </m:dPr>
@@ -9014,7 +9002,7 @@
                             <m:dPr>
                               <m:ctrlPr>
                                 <a:rPr lang="pl-PL" sz="1600" i="1">
-                                  <a:latin typeface="Cambria Math" panose="02040503050406030204" pitchFamily="18" charset="0"/>
+                                  <a:latin typeface="Cambria Math"/>
                                 </a:rPr>
                               </m:ctrlPr>
                             </m:dPr>
@@ -9043,7 +9031,7 @@
                             <m:dPr>
                               <m:ctrlPr>
                                 <a:rPr lang="pl-PL" sz="1600" i="1">
-                                  <a:latin typeface="Cambria Math" panose="02040503050406030204" pitchFamily="18" charset="0"/>
+                                  <a:latin typeface="Cambria Math"/>
                                 </a:rPr>
                               </m:ctrlPr>
                             </m:dPr>
@@ -9076,7 +9064,7 @@
                           <m:chr m:val="̇"/>
                           <m:ctrlPr>
                             <a:rPr lang="pl-PL" sz="1600" i="1">
-                              <a:latin typeface="Cambria Math" panose="02040503050406030204" pitchFamily="18" charset="0"/>
+                              <a:latin typeface="Cambria Math"/>
                             </a:rPr>
                           </m:ctrlPr>
                         </m:accPr>
@@ -9093,7 +9081,7 @@
                         <m:dPr>
                           <m:ctrlPr>
                             <a:rPr lang="pl-PL" sz="1600" i="1">
-                              <a:latin typeface="Cambria Math" panose="02040503050406030204" pitchFamily="18" charset="0"/>
+                              <a:latin typeface="Cambria Math"/>
                             </a:rPr>
                           </m:ctrlPr>
                         </m:dPr>
@@ -9122,7 +9110,7 @@
                         <m:dPr>
                           <m:ctrlPr>
                             <a:rPr lang="pl-PL" sz="1600" i="1">
-                              <a:latin typeface="Cambria Math" panose="02040503050406030204" pitchFamily="18" charset="0"/>
+                              <a:latin typeface="Cambria Math"/>
                             </a:rPr>
                           </m:ctrlPr>
                         </m:dPr>
@@ -9157,7 +9145,7 @@
                         <m:dPr>
                           <m:ctrlPr>
                             <a:rPr lang="pl-PL" sz="1600" i="1">
-                              <a:latin typeface="Cambria Math" panose="02040503050406030204" pitchFamily="18" charset="0"/>
+                              <a:latin typeface="Cambria Math"/>
                             </a:rPr>
                           </m:ctrlPr>
                         </m:dPr>
@@ -9193,7 +9181,7 @@
                         <m:dPr>
                           <m:ctrlPr>
                             <a:rPr lang="pl-PL" sz="1600" i="1">
-                              <a:latin typeface="Cambria Math" panose="02040503050406030204" pitchFamily="18" charset="0"/>
+                              <a:latin typeface="Cambria Math"/>
                             </a:rPr>
                           </m:ctrlPr>
                         </m:dPr>
@@ -9218,7 +9206,7 @@
                           <m:endChr m:val="]"/>
                           <m:ctrlPr>
                             <a:rPr lang="pl-PL" sz="1600" i="1">
-                              <a:latin typeface="Cambria Math" panose="02040503050406030204" pitchFamily="18" charset="0"/>
+                              <a:latin typeface="Cambria Math"/>
                             </a:rPr>
                           </m:ctrlPr>
                         </m:dPr>
@@ -9237,7 +9225,7 @@
                           <m:endChr m:val="]"/>
                           <m:ctrlPr>
                             <a:rPr lang="pl-PL" sz="1600" i="1">
-                              <a:latin typeface="Cambria Math" panose="02040503050406030204" pitchFamily="18" charset="0"/>
+                              <a:latin typeface="Cambria Math"/>
                             </a:rPr>
                           </m:ctrlPr>
                         </m:dPr>
@@ -9254,7 +9242,7 @@
                               </m:mcs>
                               <m:ctrlPr>
                                 <a:rPr lang="pl-PL" sz="1600" i="1">
-                                  <a:latin typeface="Cambria Math" panose="02040503050406030204" pitchFamily="18" charset="0"/>
+                                  <a:latin typeface="Cambria Math"/>
                                 </a:rPr>
                               </m:ctrlPr>
                             </m:mPr>
@@ -9264,7 +9252,7 @@
                                   <m:sSubPr>
                                     <m:ctrlPr>
                                       <a:rPr lang="pl-PL" sz="1600" i="1">
-                                        <a:latin typeface="Cambria Math" panose="02040503050406030204" pitchFamily="18" charset="0"/>
+                                        <a:latin typeface="Cambria Math"/>
                                       </a:rPr>
                                     </m:ctrlPr>
                                   </m:sSubPr>
@@ -9320,7 +9308,7 @@
                                   <m:sSubPr>
                                     <m:ctrlPr>
                                       <a:rPr lang="pl-PL" sz="1600" i="1">
-                                        <a:latin typeface="Cambria Math" panose="02040503050406030204" pitchFamily="18" charset="0"/>
+                                        <a:latin typeface="Cambria Math"/>
                                       </a:rPr>
                                     </m:ctrlPr>
                                   </m:sSubPr>
@@ -9374,7 +9362,7 @@
                         <m:sSubPr>
                           <m:ctrlPr>
                             <a:rPr lang="pl-PL" sz="1600" i="1">
-                              <a:latin typeface="Cambria Math" panose="02040503050406030204" pitchFamily="18" charset="0"/>
+                              <a:latin typeface="Cambria Math"/>
                             </a:rPr>
                           </m:ctrlPr>
                         </m:sSubPr>
@@ -9399,7 +9387,7 @@
                         <m:dPr>
                           <m:ctrlPr>
                             <a:rPr lang="pl-PL" sz="1600" i="1">
-                              <a:latin typeface="Cambria Math" panose="02040503050406030204" pitchFamily="18" charset="0"/>
+                              <a:latin typeface="Cambria Math"/>
                             </a:rPr>
                           </m:ctrlPr>
                         </m:dPr>
@@ -9422,7 +9410,7 @@
                         <m:sSubPr>
                           <m:ctrlPr>
                             <a:rPr lang="pl-PL" sz="1600" i="1">
-                              <a:latin typeface="Cambria Math" panose="02040503050406030204" pitchFamily="18" charset="0"/>
+                              <a:latin typeface="Cambria Math"/>
                             </a:rPr>
                           </m:ctrlPr>
                         </m:sSubPr>
@@ -9472,7 +9460,7 @@
             </p:txBody>
           </p:sp>
         </mc:Choice>
-        <mc:Fallback>
+        <mc:Fallback xmlns="">
           <p:sp>
             <p:nvSpPr>
               <p:cNvPr id="3" name="Prostokąt 2">
@@ -9547,7 +9535,7 @@
           <p:cNvPr id="8194" name="Tytuł 1">
             <a:extLst>
               <a:ext uri="{FF2B5EF4-FFF2-40B4-BE49-F238E27FC236}">
-                <a16:creationId xmlns:a16="http://schemas.microsoft.com/office/drawing/2014/main" id="{B90EFA88-F91C-4B8D-B17C-96104C12F57E}"/>
+                <a16:creationId xmlns="" xmlns:a16="http://schemas.microsoft.com/office/drawing/2014/main" id="{B90EFA88-F91C-4B8D-B17C-96104C12F57E}"/>
               </a:ext>
             </a:extLst>
           </p:cNvPr>
@@ -9586,7 +9574,7 @@
           <p:cNvPr id="8195" name="Symbol zastępczy numeru slajdu 3">
             <a:extLst>
               <a:ext uri="{FF2B5EF4-FFF2-40B4-BE49-F238E27FC236}">
-                <a16:creationId xmlns:a16="http://schemas.microsoft.com/office/drawing/2014/main" id="{7B9B41F0-74A3-43AF-ACCF-8873D49E98D5}"/>
+                <a16:creationId xmlns="" xmlns:a16="http://schemas.microsoft.com/office/drawing/2014/main" id="{7B9B41F0-74A3-43AF-ACCF-8873D49E98D5}"/>
               </a:ext>
             </a:extLst>
           </p:cNvPr>
@@ -9788,7 +9776,7 @@
           <p:cNvPr id="6" name="Symbol zastępczy daty 5">
             <a:extLst>
               <a:ext uri="{FF2B5EF4-FFF2-40B4-BE49-F238E27FC236}">
-                <a16:creationId xmlns:a16="http://schemas.microsoft.com/office/drawing/2014/main" id="{1E57C8A5-79AE-4020-9F94-1B26AFFE5F02}"/>
+                <a16:creationId xmlns="" xmlns:a16="http://schemas.microsoft.com/office/drawing/2014/main" id="{1E57C8A5-79AE-4020-9F94-1B26AFFE5F02}"/>
               </a:ext>
             </a:extLst>
           </p:cNvPr>
@@ -9820,7 +9808,7 @@
           <p:cNvPr id="7" name="Symbol zastępczy stopki 6">
             <a:extLst>
               <a:ext uri="{FF2B5EF4-FFF2-40B4-BE49-F238E27FC236}">
-                <a16:creationId xmlns:a16="http://schemas.microsoft.com/office/drawing/2014/main" id="{540FBF6D-62F0-48EA-9ECE-0F33DDAC3BE0}"/>
+                <a16:creationId xmlns="" xmlns:a16="http://schemas.microsoft.com/office/drawing/2014/main" id="{540FBF6D-62F0-48EA-9ECE-0F33DDAC3BE0}"/>
               </a:ext>
             </a:extLst>
           </p:cNvPr>
@@ -9856,7 +9844,7 @@
         <p:spPr>
           <a:xfrm>
             <a:off x="1258479" y="495546"/>
-            <a:ext cx="6363093" cy="369332"/>
+            <a:ext cx="6363093" cy="646331"/>
           </a:xfrm>
           <a:prstGeom prst="rect">
             <a:avLst/>
@@ -9871,8 +9859,205 @@
           <a:p>
             <a:r>
               <a:rPr lang="pl-PL" dirty="0"/>
-              <a:t>Wykorzystując pakiet SIMULIK zamodelowano układ równań:</a:t>
+              <a:t>Wykorzystując pakiet SIMULIK zamodelowano układ </a:t>
             </a:r>
+            <a:r>
+              <a:rPr lang="pl-PL" dirty="0" smtClean="0"/>
+              <a:t>równań i dokonano nastaw regulatora:</a:t>
+            </a:r>
+            <a:endParaRPr lang="pl-PL" dirty="0"/>
+          </a:p>
+        </p:txBody>
+      </p:sp>
+      <p:pic>
+        <p:nvPicPr>
+          <p:cNvPr id="1026" name="Picture 2"/>
+          <p:cNvPicPr>
+            <a:picLocks noChangeAspect="1" noChangeArrowheads="1"/>
+          </p:cNvPicPr>
+          <p:nvPr/>
+        </p:nvPicPr>
+        <p:blipFill>
+          <a:blip r:embed="rId3">
+            <a:extLst>
+              <a:ext uri="{28A0092B-C50C-407E-A947-70E740481C1C}">
+                <a14:useLocalDpi xmlns:a14="http://schemas.microsoft.com/office/drawing/2010/main" val="0"/>
+              </a:ext>
+            </a:extLst>
+          </a:blip>
+          <a:srcRect/>
+          <a:stretch>
+            <a:fillRect/>
+          </a:stretch>
+        </p:blipFill>
+        <p:spPr bwMode="auto">
+          <a:xfrm>
+            <a:off x="381001" y="1073150"/>
+            <a:ext cx="4430444" cy="2490446"/>
+          </a:xfrm>
+          <a:prstGeom prst="rect">
+            <a:avLst/>
+          </a:prstGeom>
+          <a:noFill/>
+          <a:ln>
+            <a:noFill/>
+          </a:ln>
+          <a:extLst>
+            <a:ext uri="{909E8E84-426E-40DD-AFC4-6F175D3DCCD1}">
+              <a14:hiddenFill xmlns:a14="http://schemas.microsoft.com/office/drawing/2010/main">
+                <a:solidFill>
+                  <a:schemeClr val="accent1"/>
+                </a:solidFill>
+              </a14:hiddenFill>
+            </a:ext>
+            <a:ext uri="{91240B29-F687-4F45-9708-019B960494DF}">
+              <a14:hiddenLine xmlns:a14="http://schemas.microsoft.com/office/drawing/2010/main" w="9525">
+                <a:solidFill>
+                  <a:schemeClr val="tx1"/>
+                </a:solidFill>
+                <a:miter lim="800000"/>
+                <a:headEnd/>
+                <a:tailEnd/>
+              </a14:hiddenLine>
+            </a:ext>
+          </a:extLst>
+        </p:spPr>
+      </p:pic>
+      <p:pic>
+        <p:nvPicPr>
+          <p:cNvPr id="1028" name="Picture 4"/>
+          <p:cNvPicPr>
+            <a:picLocks noChangeAspect="1" noChangeArrowheads="1"/>
+          </p:cNvPicPr>
+          <p:nvPr/>
+        </p:nvPicPr>
+        <p:blipFill>
+          <a:blip r:embed="rId4">
+            <a:extLst>
+              <a:ext uri="{28A0092B-C50C-407E-A947-70E740481C1C}">
+                <a14:useLocalDpi xmlns:a14="http://schemas.microsoft.com/office/drawing/2010/main" val="0"/>
+              </a:ext>
+            </a:extLst>
+          </a:blip>
+          <a:srcRect/>
+          <a:stretch>
+            <a:fillRect/>
+          </a:stretch>
+        </p:blipFill>
+        <p:spPr bwMode="auto">
+          <a:xfrm>
+            <a:off x="5064185" y="1141877"/>
+            <a:ext cx="3746530" cy="2491624"/>
+          </a:xfrm>
+          <a:prstGeom prst="rect">
+            <a:avLst/>
+          </a:prstGeom>
+          <a:noFill/>
+          <a:ln>
+            <a:noFill/>
+          </a:ln>
+          <a:extLst>
+            <a:ext uri="{909E8E84-426E-40DD-AFC4-6F175D3DCCD1}">
+              <a14:hiddenFill xmlns:a14="http://schemas.microsoft.com/office/drawing/2010/main">
+                <a:solidFill>
+                  <a:schemeClr val="accent1"/>
+                </a:solidFill>
+              </a14:hiddenFill>
+            </a:ext>
+            <a:ext uri="{91240B29-F687-4F45-9708-019B960494DF}">
+              <a14:hiddenLine xmlns:a14="http://schemas.microsoft.com/office/drawing/2010/main" w="9525">
+                <a:solidFill>
+                  <a:schemeClr val="tx1"/>
+                </a:solidFill>
+                <a:miter lim="800000"/>
+                <a:headEnd/>
+                <a:tailEnd/>
+              </a14:hiddenLine>
+            </a:ext>
+          </a:extLst>
+        </p:spPr>
+      </p:pic>
+      <p:pic>
+        <p:nvPicPr>
+          <p:cNvPr id="1029" name="Picture 5"/>
+          <p:cNvPicPr>
+            <a:picLocks noChangeAspect="1" noChangeArrowheads="1"/>
+          </p:cNvPicPr>
+          <p:nvPr/>
+        </p:nvPicPr>
+        <p:blipFill>
+          <a:blip r:embed="rId5">
+            <a:extLst>
+              <a:ext uri="{28A0092B-C50C-407E-A947-70E740481C1C}">
+                <a14:useLocalDpi xmlns:a14="http://schemas.microsoft.com/office/drawing/2010/main" val="0"/>
+              </a:ext>
+            </a:extLst>
+          </a:blip>
+          <a:srcRect/>
+          <a:stretch>
+            <a:fillRect/>
+          </a:stretch>
+        </p:blipFill>
+        <p:spPr bwMode="auto">
+          <a:xfrm>
+            <a:off x="381001" y="3794332"/>
+            <a:ext cx="3226719" cy="2314111"/>
+          </a:xfrm>
+          <a:prstGeom prst="rect">
+            <a:avLst/>
+          </a:prstGeom>
+          <a:noFill/>
+          <a:ln>
+            <a:noFill/>
+          </a:ln>
+          <a:extLst>
+            <a:ext uri="{909E8E84-426E-40DD-AFC4-6F175D3DCCD1}">
+              <a14:hiddenFill xmlns:a14="http://schemas.microsoft.com/office/drawing/2010/main">
+                <a:solidFill>
+                  <a:schemeClr val="accent1"/>
+                </a:solidFill>
+              </a14:hiddenFill>
+            </a:ext>
+            <a:ext uri="{91240B29-F687-4F45-9708-019B960494DF}">
+              <a14:hiddenLine xmlns:a14="http://schemas.microsoft.com/office/drawing/2010/main" w="9525">
+                <a:solidFill>
+                  <a:schemeClr val="tx1"/>
+                </a:solidFill>
+                <a:miter lim="800000"/>
+                <a:headEnd/>
+                <a:tailEnd/>
+              </a14:hiddenLine>
+            </a:ext>
+          </a:extLst>
+        </p:spPr>
+      </p:pic>
+      <p:sp>
+        <p:nvSpPr>
+          <p:cNvPr id="3" name="pole tekstowe 2"/>
+          <p:cNvSpPr txBox="1"/>
+          <p:nvPr/>
+        </p:nvSpPr>
+        <p:spPr>
+          <a:xfrm>
+            <a:off x="4811445" y="4631821"/>
+            <a:ext cx="3999270" cy="369332"/>
+          </a:xfrm>
+          <a:prstGeom prst="rect">
+            <a:avLst/>
+          </a:prstGeom>
+          <a:noFill/>
+        </p:spPr>
+        <p:txBody>
+          <a:bodyPr wrap="square" rtlCol="0">
+            <a:spAutoFit/>
+          </a:bodyPr>
+          <a:lstStyle/>
+          <a:p>
+            <a:r>
+              <a:rPr lang="pl-PL" dirty="0" smtClean="0"/>
+              <a:t>Przyjęto k=1054, Alfa=123.1 Beta=0.125.</a:t>
+            </a:r>
+            <a:endParaRPr lang="pl-PL" dirty="0"/>
           </a:p>
         </p:txBody>
       </p:sp>
@@ -9906,7 +10091,7 @@
           <p:cNvPr id="10242" name="Tytuł 1">
             <a:extLst>
               <a:ext uri="{FF2B5EF4-FFF2-40B4-BE49-F238E27FC236}">
-                <a16:creationId xmlns:a16="http://schemas.microsoft.com/office/drawing/2014/main" id="{F2BD3071-640D-468B-94DB-1D197D829254}"/>
+                <a16:creationId xmlns="" xmlns:a16="http://schemas.microsoft.com/office/drawing/2014/main" id="{F2BD3071-640D-468B-94DB-1D197D829254}"/>
               </a:ext>
             </a:extLst>
           </p:cNvPr>
@@ -9945,7 +10130,7 @@
           <p:cNvPr id="10243" name="Symbol zastępczy numeru slajdu 3">
             <a:extLst>
               <a:ext uri="{FF2B5EF4-FFF2-40B4-BE49-F238E27FC236}">
-                <a16:creationId xmlns:a16="http://schemas.microsoft.com/office/drawing/2014/main" id="{1B0BE0FE-08ED-42CA-89BC-A3C550BD95C5}"/>
+                <a16:creationId xmlns="" xmlns:a16="http://schemas.microsoft.com/office/drawing/2014/main" id="{1B0BE0FE-08ED-42CA-89BC-A3C550BD95C5}"/>
               </a:ext>
             </a:extLst>
           </p:cNvPr>
@@ -10147,7 +10332,7 @@
           <p:cNvPr id="6" name="Symbol zastępczy daty 5">
             <a:extLst>
               <a:ext uri="{FF2B5EF4-FFF2-40B4-BE49-F238E27FC236}">
-                <a16:creationId xmlns:a16="http://schemas.microsoft.com/office/drawing/2014/main" id="{042761D1-4A2D-46ED-ABA7-58D97E2CF24D}"/>
+                <a16:creationId xmlns="" xmlns:a16="http://schemas.microsoft.com/office/drawing/2014/main" id="{042761D1-4A2D-46ED-ABA7-58D97E2CF24D}"/>
               </a:ext>
             </a:extLst>
           </p:cNvPr>
@@ -10179,7 +10364,7 @@
           <p:cNvPr id="7" name="Symbol zastępczy stopki 6">
             <a:extLst>
               <a:ext uri="{FF2B5EF4-FFF2-40B4-BE49-F238E27FC236}">
-                <a16:creationId xmlns:a16="http://schemas.microsoft.com/office/drawing/2014/main" id="{C427A2E0-AC89-4124-8939-6F39408788F3}"/>
+                <a16:creationId xmlns="" xmlns:a16="http://schemas.microsoft.com/office/drawing/2014/main" id="{C427A2E0-AC89-4124-8939-6F39408788F3}"/>
               </a:ext>
             </a:extLst>
           </p:cNvPr>
@@ -10202,6 +10387,90 @@
               <a:rPr lang="pl-PL" dirty="0"/>
               <a:t>Sprawozdanie z ćwiczeń laboratoryjnych z Automatyki Pojazdowej</a:t>
             </a:r>
+          </a:p>
+        </p:txBody>
+      </p:sp>
+      <p:pic>
+        <p:nvPicPr>
+          <p:cNvPr id="2051" name="Picture 3"/>
+          <p:cNvPicPr>
+            <a:picLocks noChangeAspect="1" noChangeArrowheads="1"/>
+          </p:cNvPicPr>
+          <p:nvPr/>
+        </p:nvPicPr>
+        <p:blipFill>
+          <a:blip r:embed="rId3">
+            <a:extLst>
+              <a:ext uri="{28A0092B-C50C-407E-A947-70E740481C1C}">
+                <a14:useLocalDpi xmlns:a14="http://schemas.microsoft.com/office/drawing/2010/main" val="0"/>
+              </a:ext>
+            </a:extLst>
+          </a:blip>
+          <a:srcRect/>
+          <a:stretch>
+            <a:fillRect/>
+          </a:stretch>
+        </p:blipFill>
+        <p:spPr bwMode="auto">
+          <a:xfrm>
+            <a:off x="177800" y="1460115"/>
+            <a:ext cx="8966200" cy="4997450"/>
+          </a:xfrm>
+          <a:prstGeom prst="rect">
+            <a:avLst/>
+          </a:prstGeom>
+          <a:noFill/>
+          <a:ln>
+            <a:noFill/>
+          </a:ln>
+          <a:extLst>
+            <a:ext uri="{909E8E84-426E-40DD-AFC4-6F175D3DCCD1}">
+              <a14:hiddenFill xmlns:a14="http://schemas.microsoft.com/office/drawing/2010/main">
+                <a:solidFill>
+                  <a:schemeClr val="accent1"/>
+                </a:solidFill>
+              </a14:hiddenFill>
+            </a:ext>
+            <a:ext uri="{91240B29-F687-4F45-9708-019B960494DF}">
+              <a14:hiddenLine xmlns:a14="http://schemas.microsoft.com/office/drawing/2010/main" w="9525">
+                <a:solidFill>
+                  <a:schemeClr val="tx1"/>
+                </a:solidFill>
+                <a:miter lim="800000"/>
+                <a:headEnd/>
+                <a:tailEnd/>
+              </a14:hiddenLine>
+            </a:ext>
+          </a:extLst>
+        </p:spPr>
+      </p:pic>
+      <p:sp>
+        <p:nvSpPr>
+          <p:cNvPr id="2" name="pole tekstowe 1"/>
+          <p:cNvSpPr txBox="1"/>
+          <p:nvPr/>
+        </p:nvSpPr>
+        <p:spPr>
+          <a:xfrm>
+            <a:off x="457200" y="743484"/>
+            <a:ext cx="8575705" cy="369332"/>
+          </a:xfrm>
+          <a:prstGeom prst="rect">
+            <a:avLst/>
+          </a:prstGeom>
+          <a:noFill/>
+        </p:spPr>
+        <p:txBody>
+          <a:bodyPr wrap="square" rtlCol="0">
+            <a:spAutoFit/>
+          </a:bodyPr>
+          <a:lstStyle/>
+          <a:p>
+            <a:r>
+              <a:rPr lang="pl-PL" dirty="0" smtClean="0"/>
+              <a:t>Zachowanie regulatora przy optymalnych nastawach dla symulowanej wyboistej drogi. </a:t>
+            </a:r>
+            <a:endParaRPr lang="pl-PL" dirty="0"/>
           </a:p>
         </p:txBody>
       </p:sp>
@@ -10235,7 +10504,7 @@
           <p:cNvPr id="12290" name="Tytuł 1">
             <a:extLst>
               <a:ext uri="{FF2B5EF4-FFF2-40B4-BE49-F238E27FC236}">
-                <a16:creationId xmlns:a16="http://schemas.microsoft.com/office/drawing/2014/main" id="{8DC32D7B-D560-4E0F-84E6-D7CFA1D1E61C}"/>
+                <a16:creationId xmlns="" xmlns:a16="http://schemas.microsoft.com/office/drawing/2014/main" id="{8DC32D7B-D560-4E0F-84E6-D7CFA1D1E61C}"/>
               </a:ext>
             </a:extLst>
           </p:cNvPr>
@@ -10269,7 +10538,7 @@
           <p:cNvPr id="12292" name="Symbol zastępczy numeru slajdu 3">
             <a:extLst>
               <a:ext uri="{FF2B5EF4-FFF2-40B4-BE49-F238E27FC236}">
-                <a16:creationId xmlns:a16="http://schemas.microsoft.com/office/drawing/2014/main" id="{B00D1200-BD3C-42A6-9209-1E15613F3399}"/>
+                <a16:creationId xmlns="" xmlns:a16="http://schemas.microsoft.com/office/drawing/2014/main" id="{B00D1200-BD3C-42A6-9209-1E15613F3399}"/>
               </a:ext>
             </a:extLst>
           </p:cNvPr>
@@ -10471,7 +10740,7 @@
           <p:cNvPr id="6" name="Symbol zastępczy daty 5">
             <a:extLst>
               <a:ext uri="{FF2B5EF4-FFF2-40B4-BE49-F238E27FC236}">
-                <a16:creationId xmlns:a16="http://schemas.microsoft.com/office/drawing/2014/main" id="{A514A7E1-B7D3-4314-B3AC-B1942CC73641}"/>
+                <a16:creationId xmlns="" xmlns:a16="http://schemas.microsoft.com/office/drawing/2014/main" id="{A514A7E1-B7D3-4314-B3AC-B1942CC73641}"/>
               </a:ext>
             </a:extLst>
           </p:cNvPr>
@@ -10503,7 +10772,7 @@
           <p:cNvPr id="7" name="Symbol zastępczy stopki 6">
             <a:extLst>
               <a:ext uri="{FF2B5EF4-FFF2-40B4-BE49-F238E27FC236}">
-                <a16:creationId xmlns:a16="http://schemas.microsoft.com/office/drawing/2014/main" id="{9D884240-C741-4827-8114-E7F17C937FF7}"/>
+                <a16:creationId xmlns="" xmlns:a16="http://schemas.microsoft.com/office/drawing/2014/main" id="{9D884240-C741-4827-8114-E7F17C937FF7}"/>
               </a:ext>
             </a:extLst>
           </p:cNvPr>
@@ -10535,7 +10804,7 @@
           <p:cNvPr id="3" name="pole tekstowe 2">
             <a:extLst>
               <a:ext uri="{FF2B5EF4-FFF2-40B4-BE49-F238E27FC236}">
-                <a16:creationId xmlns:a16="http://schemas.microsoft.com/office/drawing/2014/main" id="{540354F1-C7CE-4373-8C20-8678BF31DBA3}"/>
+                <a16:creationId xmlns="" xmlns:a16="http://schemas.microsoft.com/office/drawing/2014/main" id="{540354F1-C7CE-4373-8C20-8678BF31DBA3}"/>
               </a:ext>
             </a:extLst>
           </p:cNvPr>
@@ -10563,6 +10832,36 @@
                 <a:spcPct val="150000"/>
               </a:lnSpc>
             </a:pPr>
+            <a:endParaRPr lang="pl-PL" dirty="0"/>
+          </a:p>
+        </p:txBody>
+      </p:sp>
+      <p:sp>
+        <p:nvSpPr>
+          <p:cNvPr id="2" name="pole tekstowe 1"/>
+          <p:cNvSpPr txBox="1"/>
+          <p:nvPr/>
+        </p:nvSpPr>
+        <p:spPr>
+          <a:xfrm>
+            <a:off x="564023" y="2050026"/>
+            <a:ext cx="8169779" cy="1754326"/>
+          </a:xfrm>
+          <a:prstGeom prst="rect">
+            <a:avLst/>
+          </a:prstGeom>
+          <a:noFill/>
+        </p:spPr>
+        <p:txBody>
+          <a:bodyPr wrap="square" rtlCol="0">
+            <a:spAutoFit/>
+          </a:bodyPr>
+          <a:lstStyle/>
+          <a:p>
+            <a:r>
+              <a:rPr lang="pl-PL" dirty="0" smtClean="0"/>
+              <a:t>Po przyjęciu modelu dwumasowego i potraktowaniu samochodu jako układu masowo – sprężystego jesteśmy w stanie skutecznie rozważać zachowanie zawieszenia samochodowego w zależności od terenu po którym porusza się samochód. Ważnym elementem optymalnej stabilizacji jest dobór odpowiedniego regulatora, który określa jej jakość. Przy odpowiednio dobranych parametrach regulacja następuje bardzo szybko i niezauważalnie dla kierowcy.  </a:t>
+            </a:r>
             <a:endParaRPr lang="pl-PL" dirty="0"/>
           </a:p>
         </p:txBody>

</xml_diff>